<commit_message>
Added milestone 1, 2 and 3
</commit_message>
<xml_diff>
--- a/Project Proposal Template.pptx
+++ b/Project Proposal Template.pptx
@@ -7,9 +7,16 @@
   <p:sldIdLst>
     <p:sldId id="256" r:id="rId2"/>
     <p:sldId id="261" r:id="rId3"/>
-    <p:sldId id="258" r:id="rId4"/>
-    <p:sldId id="259" r:id="rId5"/>
-    <p:sldId id="260" r:id="rId6"/>
+    <p:sldId id="262" r:id="rId4"/>
+    <p:sldId id="263" r:id="rId5"/>
+    <p:sldId id="267" r:id="rId6"/>
+    <p:sldId id="268" r:id="rId7"/>
+    <p:sldId id="264" r:id="rId8"/>
+    <p:sldId id="265" r:id="rId9"/>
+    <p:sldId id="266" r:id="rId10"/>
+    <p:sldId id="258" r:id="rId11"/>
+    <p:sldId id="259" r:id="rId12"/>
+    <p:sldId id="260" r:id="rId13"/>
   </p:sldIdLst>
   <p:sldSz cx="12192000" cy="6858000"/>
   <p:notesSz cx="6858000" cy="9144000"/>
@@ -3805,7 +3812,7 @@
 </p:sld>
 </file>
 
-<file path=ppt/slides/slide2.xml><?xml version="1.0" encoding="utf-8"?>
+<file path=ppt/slides/slide10.xml><?xml version="1.0" encoding="utf-8"?>
 <p:sld xmlns:a="http://schemas.openxmlformats.org/drawingml/2006/main" xmlns:r="http://schemas.openxmlformats.org/officeDocument/2006/relationships" xmlns:p="http://schemas.openxmlformats.org/presentationml/2006/main">
   <p:cSld>
     <p:bg>
@@ -3832,7 +3839,7 @@
       </p:grpSpPr>
       <p:sp>
         <p:nvSpPr>
-          <p:cNvPr id="19" name="Freeform: Shape 18">
+          <p:cNvPr id="30" name="Freeform: Shape 29">
             <a:extLst>
               <a:ext uri="{FF2B5EF4-FFF2-40B4-BE49-F238E27FC236}">
                 <a16:creationId xmlns:a16="http://schemas.microsoft.com/office/drawing/2014/main" id="{49306479-8C4D-4E4A-A330-DFC80A8A01BE}"/>
@@ -3993,7 +4000,7 @@
       </p:sp>
       <p:sp useBgFill="1">
         <p:nvSpPr>
-          <p:cNvPr id="21" name="Rectangle 20">
+          <p:cNvPr id="32" name="Rectangle 31">
             <a:extLst>
               <a:ext uri="{FF2B5EF4-FFF2-40B4-BE49-F238E27FC236}">
                 <a16:creationId xmlns:a16="http://schemas.microsoft.com/office/drawing/2014/main" id="{84136905-015B-4510-B514-027CBA846BD6}"/>
@@ -4069,8 +4076,8 @@
         </p:nvSpPr>
         <p:spPr>
           <a:xfrm>
-            <a:off x="762000" y="758951"/>
-            <a:ext cx="3880511" cy="1577849"/>
+            <a:off x="762000" y="755650"/>
+            <a:ext cx="4247321" cy="1033393"/>
           </a:xfrm>
         </p:spPr>
         <p:txBody>
@@ -4081,7 +4088,7 @@
           <a:p>
             <a:pPr algn="l"/>
             <a:r>
-              <a:rPr lang="en-US" sz="4200" kern="1200" spc="-50" baseline="0">
+              <a:rPr lang="en-US" sz="2900" kern="1200" spc="-50" baseline="0" dirty="0">
                 <a:solidFill>
                   <a:schemeClr val="tx1"/>
                 </a:solidFill>
@@ -4089,7 +4096,7 @@
                 <a:ea typeface="+mj-ea"/>
                 <a:cs typeface="+mj-cs"/>
               </a:rPr>
-              <a:t>Overview</a:t>
+              <a:t>Questions to Answer</a:t>
             </a:r>
           </a:p>
         </p:txBody>
@@ -4112,8 +4119,8 @@
         </p:nvSpPr>
         <p:spPr>
           <a:xfrm>
-            <a:off x="762000" y="1983544"/>
-            <a:ext cx="4822874" cy="4311150"/>
+            <a:off x="762001" y="2207969"/>
+            <a:ext cx="3932830" cy="3884983"/>
           </a:xfrm>
         </p:spPr>
         <p:txBody>
@@ -4122,82 +4129,81 @@
           </a:bodyPr>
           <a:lstStyle/>
           <a:p>
-            <a:pPr algn="l">
+            <a:pPr marL="171450" indent="-171450" algn="l">
               <a:lnSpc>
                 <a:spcPct val="95000"/>
               </a:lnSpc>
+              <a:buFont typeface="Arial" panose="020B0604020202020204" pitchFamily="34" charset="0"/>
+              <a:buChar char="•"/>
             </a:pPr>
             <a:r>
-              <a:rPr lang="en-US" sz="1200" dirty="0"/>
-              <a:t>The data used for this analysis is the "</a:t>
-            </a:r>
-            <a:r>
-              <a:rPr lang="en-US" sz="1200" dirty="0" err="1"/>
-              <a:t>SportsStats</a:t>
-            </a:r>
-            <a:r>
-              <a:rPr lang="en-US" sz="1200" dirty="0"/>
-              <a:t> (Olympics Dataset - 120 years of data)" data set.</a:t>
-            </a:r>
-          </a:p>
-          <a:p>
-            <a:pPr algn="l">
+              <a:rPr lang="en-US" sz="1700" b="1" dirty="0"/>
+              <a:t>How many Peruvians won a gold medal?</a:t>
+            </a:r>
+          </a:p>
+          <a:p>
+            <a:pPr marL="171450" indent="-171450" algn="l">
               <a:lnSpc>
                 <a:spcPct val="95000"/>
               </a:lnSpc>
+              <a:buFont typeface="Arial" panose="020B0604020202020204" pitchFamily="34" charset="0"/>
+              <a:buChar char="•"/>
             </a:pPr>
             <a:r>
-              <a:rPr lang="en-US" sz="1200" dirty="0"/>
-              <a:t>This dataset is made up of two files: athlet_events.csv and noc_regions.csv.</a:t>
-            </a:r>
-          </a:p>
-          <a:p>
-            <a:pPr algn="l">
+              <a:rPr lang="en-US" sz="1700" b="1" dirty="0"/>
+              <a:t>Has Cristiano Ronaldo (CR7) won any medals?</a:t>
+            </a:r>
+          </a:p>
+          <a:p>
+            <a:pPr marL="171450" indent="-171450" algn="l">
               <a:lnSpc>
                 <a:spcPct val="95000"/>
               </a:lnSpc>
+              <a:buFont typeface="Arial" panose="020B0604020202020204" pitchFamily="34" charset="0"/>
+              <a:buChar char="•"/>
             </a:pPr>
-            <a:endParaRPr lang="en-US" sz="1200" dirty="0"/>
-          </a:p>
-          <a:p>
-            <a:pPr algn="l">
+            <a:r>
+              <a:rPr lang="en-US" sz="1700" b="1" dirty="0"/>
+              <a:t>Which sporting event gathered the most athletes?</a:t>
+            </a:r>
+          </a:p>
+          <a:p>
+            <a:pPr marL="171450" indent="-171450" algn="l">
               <a:lnSpc>
                 <a:spcPct val="95000"/>
               </a:lnSpc>
+              <a:buFont typeface="Arial" panose="020B0604020202020204" pitchFamily="34" charset="0"/>
+              <a:buChar char="•"/>
             </a:pPr>
             <a:r>
-              <a:rPr lang="en-US" sz="1200" dirty="0"/>
-              <a:t>This data set was chosen because it reveals the Olympic medal award records for different sports categories, the countries that participated, names of the athletes, age, medals, etc.</a:t>
-            </a:r>
-          </a:p>
-          <a:p>
-            <a:pPr algn="l">
+              <a:rPr lang="en-US" sz="1700" b="1" dirty="0"/>
+              <a:t>In which year were the most gold medals awarded?</a:t>
+            </a:r>
+          </a:p>
+          <a:p>
+            <a:pPr marL="171450" indent="-171450" algn="l">
               <a:lnSpc>
                 <a:spcPct val="95000"/>
               </a:lnSpc>
+              <a:buFont typeface="Arial" panose="020B0604020202020204" pitchFamily="34" charset="0"/>
+              <a:buChar char="•"/>
             </a:pPr>
             <a:r>
-              <a:rPr lang="en-US" sz="1200" dirty="0"/>
-              <a:t>Likewise, it can be said that the data is useful for news agencies that report on the different feats in the 120 years of the existence of the Olympic games.</a:t>
-            </a:r>
-          </a:p>
-          <a:p>
-            <a:pPr algn="l">
+              <a:rPr lang="en-US" sz="1700" b="1" dirty="0"/>
+              <a:t>In the 120 years of the Olympic Games, which country's team won the most medals?</a:t>
+            </a:r>
+          </a:p>
+          <a:p>
+            <a:pPr marL="171450" indent="-171450" algn="l">
               <a:lnSpc>
                 <a:spcPct val="95000"/>
               </a:lnSpc>
+              <a:buFont typeface="Arial" panose="020B0604020202020204" pitchFamily="34" charset="0"/>
+              <a:buChar char="•"/>
             </a:pPr>
-            <a:endParaRPr lang="en-US" sz="1200" dirty="0"/>
-          </a:p>
-          <a:p>
-            <a:pPr algn="l">
-              <a:lnSpc>
-                <a:spcPct val="95000"/>
-              </a:lnSpc>
-            </a:pPr>
-            <a:r>
-              <a:rPr lang="en-US" sz="1200" dirty="0"/>
-              <a:t>Also, it can be of great importance for countries aspiring to improve their performance in subsequent Olympic events.</a:t>
+            <a:r>
+              <a:rPr lang="en-US" sz="1700" b="1" dirty="0"/>
+              <a:t>Which sport wins the most gold medals?</a:t>
             </a:r>
           </a:p>
         </p:txBody>
@@ -4218,13 +4224,13 @@
         </p:nvPicPr>
         <p:blipFill rotWithShape="1">
           <a:blip r:embed="rId2"/>
-          <a:srcRect l="25738"/>
+          <a:srcRect l="14335" r="-1" b="-1"/>
           <a:stretch/>
         </p:blipFill>
         <p:spPr>
           <a:xfrm>
-            <a:off x="5401463" y="10"/>
-            <a:ext cx="6790537" cy="6857990"/>
+            <a:off x="5401464" y="786812"/>
+            <a:ext cx="6035826" cy="5284375"/>
           </a:xfrm>
           <a:prstGeom prst="rect">
             <a:avLst/>
@@ -4234,7 +4240,7 @@
     </p:spTree>
     <p:extLst>
       <p:ext uri="{BB962C8B-B14F-4D97-AF65-F5344CB8AC3E}">
-        <p14:creationId xmlns:p14="http://schemas.microsoft.com/office/powerpoint/2010/main" val="884976567"/>
+        <p14:creationId xmlns:p14="http://schemas.microsoft.com/office/powerpoint/2010/main" val="702693780"/>
       </p:ext>
     </p:extLst>
   </p:cSld>
@@ -4244,7 +4250,7 @@
 </p:sld>
 </file>
 
-<file path=ppt/slides/slide3.xml><?xml version="1.0" encoding="utf-8"?>
+<file path=ppt/slides/slide11.xml><?xml version="1.0" encoding="utf-8"?>
 <p:sld xmlns:a="http://schemas.openxmlformats.org/drawingml/2006/main" xmlns:r="http://schemas.openxmlformats.org/officeDocument/2006/relationships" xmlns:p="http://schemas.openxmlformats.org/presentationml/2006/main">
   <p:cSld>
     <p:bg>
@@ -4269,9 +4275,362 @@
           <a:chExt cx="0" cy="0"/>
         </a:xfrm>
       </p:grpSpPr>
-      <p:sp>
-        <p:nvSpPr>
-          <p:cNvPr id="30" name="Freeform: Shape 29">
+      <p:sp useBgFill="1">
+        <p:nvSpPr>
+          <p:cNvPr id="13" name="Rectangle 8">
+            <a:extLst>
+              <a:ext uri="{FF2B5EF4-FFF2-40B4-BE49-F238E27FC236}">
+                <a16:creationId xmlns:a16="http://schemas.microsoft.com/office/drawing/2014/main" id="{9B45BA4C-9B54-4496-821F-9E0985CA984D}"/>
+              </a:ext>
+              <a:ext uri="{C183D7F6-B498-43B3-948B-1728B52AA6E4}">
+                <adec:decorative xmlns:adec="http://schemas.microsoft.com/office/drawing/2017/decorative" val="1"/>
+              </a:ext>
+            </a:extLst>
+          </p:cNvPr>
+          <p:cNvSpPr>
+            <a:spLocks noGrp="1" noRot="1" noChangeAspect="1" noMove="1" noResize="1" noEditPoints="1" noAdjustHandles="1" noChangeArrowheads="1" noChangeShapeType="1" noTextEdit="1"/>
+          </p:cNvSpPr>
+          <p:nvPr>
+            <p:extLst>
+              <p:ext uri="{386F3935-93C4-4BCD-93E2-E3B085C9AB24}">
+                <p16:designElem xmlns:p16="http://schemas.microsoft.com/office/powerpoint/2015/main" val="1"/>
+              </p:ext>
+            </p:extLst>
+          </p:nvPr>
+        </p:nvSpPr>
+        <p:spPr>
+          <a:xfrm>
+            <a:off x="0" y="0"/>
+            <a:ext cx="12192000" cy="6858000"/>
+          </a:xfrm>
+          <a:prstGeom prst="rect">
+            <a:avLst/>
+          </a:prstGeom>
+          <a:ln>
+            <a:noFill/>
+          </a:ln>
+        </p:spPr>
+        <p:style>
+          <a:lnRef idx="2">
+            <a:schemeClr val="accent1">
+              <a:shade val="50000"/>
+            </a:schemeClr>
+          </a:lnRef>
+          <a:fillRef idx="1">
+            <a:schemeClr val="accent1"/>
+          </a:fillRef>
+          <a:effectRef idx="0">
+            <a:schemeClr val="accent1"/>
+          </a:effectRef>
+          <a:fontRef idx="minor">
+            <a:schemeClr val="lt1"/>
+          </a:fontRef>
+        </p:style>
+        <p:txBody>
+          <a:bodyPr rtlCol="0" anchor="ctr"/>
+          <a:lstStyle/>
+          <a:p>
+            <a:pPr algn="ctr"/>
+            <a:endParaRPr lang="en-US"/>
+          </a:p>
+        </p:txBody>
+      </p:sp>
+      <p:sp>
+        <p:nvSpPr>
+          <p:cNvPr id="2" name="Título 1">
+            <a:extLst>
+              <a:ext uri="{FF2B5EF4-FFF2-40B4-BE49-F238E27FC236}">
+                <a16:creationId xmlns:a16="http://schemas.microsoft.com/office/drawing/2014/main" id="{92B69FF4-5F8D-4B10-BAEC-4C2B411385B5}"/>
+              </a:ext>
+            </a:extLst>
+          </p:cNvPr>
+          <p:cNvSpPr>
+            <a:spLocks noGrp="1"/>
+          </p:cNvSpPr>
+          <p:nvPr>
+            <p:ph type="ctrTitle"/>
+          </p:nvPr>
+        </p:nvSpPr>
+        <p:spPr>
+          <a:xfrm>
+            <a:off x="6047979" y="375958"/>
+            <a:ext cx="5560925" cy="1558859"/>
+          </a:xfrm>
+        </p:spPr>
+        <p:txBody>
+          <a:bodyPr anchor="ctr">
+            <a:normAutofit/>
+          </a:bodyPr>
+          <a:lstStyle/>
+          <a:p>
+            <a:pPr algn="l"/>
+            <a:r>
+              <a:rPr lang="es-PE" sz="3600" dirty="0" err="1"/>
+              <a:t>Initial</a:t>
+            </a:r>
+            <a:r>
+              <a:rPr lang="es-PE" sz="3600" dirty="0"/>
+              <a:t> </a:t>
+            </a:r>
+            <a:r>
+              <a:rPr lang="es-PE" sz="3600" dirty="0" err="1"/>
+              <a:t>Hyphothesis</a:t>
+            </a:r>
+            <a:endParaRPr lang="es-PE" sz="3600" dirty="0"/>
+          </a:p>
+        </p:txBody>
+      </p:sp>
+      <p:sp>
+        <p:nvSpPr>
+          <p:cNvPr id="3" name="Subtítulo 2">
+            <a:extLst>
+              <a:ext uri="{FF2B5EF4-FFF2-40B4-BE49-F238E27FC236}">
+                <a16:creationId xmlns:a16="http://schemas.microsoft.com/office/drawing/2014/main" id="{13784A56-64CD-4842-BFFE-CAB25B8F73AC}"/>
+              </a:ext>
+            </a:extLst>
+          </p:cNvPr>
+          <p:cNvSpPr>
+            <a:spLocks noGrp="1"/>
+          </p:cNvSpPr>
+          <p:nvPr>
+            <p:ph type="subTitle" idx="1"/>
+          </p:nvPr>
+        </p:nvSpPr>
+        <p:spPr>
+          <a:xfrm>
+            <a:off x="5526157" y="2229535"/>
+            <a:ext cx="5881571" cy="4118256"/>
+          </a:xfrm>
+        </p:spPr>
+        <p:txBody>
+          <a:bodyPr>
+            <a:normAutofit fontScale="85000" lnSpcReduction="20000"/>
+          </a:bodyPr>
+          <a:lstStyle/>
+          <a:p>
+            <a:pPr marL="171450" indent="-171450" algn="l">
+              <a:lnSpc>
+                <a:spcPct val="95000"/>
+              </a:lnSpc>
+              <a:buFont typeface="Arial" panose="020B0604020202020204" pitchFamily="34" charset="0"/>
+              <a:buChar char="•"/>
+            </a:pPr>
+            <a:r>
+              <a:rPr lang="en-US" sz="1800" b="1" dirty="0"/>
+              <a:t>How many Peruvians won a gold medal?</a:t>
+            </a:r>
+          </a:p>
+          <a:p>
+            <a:pPr algn="l">
+              <a:lnSpc>
+                <a:spcPct val="95000"/>
+              </a:lnSpc>
+            </a:pPr>
+            <a:r>
+              <a:rPr lang="en-US" sz="1800" dirty="0"/>
+              <a:t>Of course there are Peruvians who won gold medals</a:t>
+            </a:r>
+          </a:p>
+          <a:p>
+            <a:pPr marL="171450" indent="-171450" algn="l">
+              <a:lnSpc>
+                <a:spcPct val="95000"/>
+              </a:lnSpc>
+              <a:buFont typeface="Arial" panose="020B0604020202020204" pitchFamily="34" charset="0"/>
+              <a:buChar char="•"/>
+            </a:pPr>
+            <a:r>
+              <a:rPr lang="en-US" sz="1800" b="1" dirty="0"/>
+              <a:t>Has Cristiano Ronaldo (CR7) won any medals?</a:t>
+            </a:r>
+          </a:p>
+          <a:p>
+            <a:pPr algn="l">
+              <a:lnSpc>
+                <a:spcPct val="95000"/>
+              </a:lnSpc>
+            </a:pPr>
+            <a:r>
+              <a:rPr lang="en-US" sz="1800" dirty="0"/>
+              <a:t>I think that CR7 has won a gold medal</a:t>
+            </a:r>
+          </a:p>
+          <a:p>
+            <a:pPr marL="171450" indent="-171450" algn="l">
+              <a:lnSpc>
+                <a:spcPct val="95000"/>
+              </a:lnSpc>
+              <a:buFont typeface="Arial" panose="020B0604020202020204" pitchFamily="34" charset="0"/>
+              <a:buChar char="•"/>
+            </a:pPr>
+            <a:r>
+              <a:rPr lang="en-US" sz="1800" b="1" dirty="0"/>
+              <a:t>Which sporting event gathered the most athletes?</a:t>
+            </a:r>
+          </a:p>
+          <a:p>
+            <a:pPr algn="l">
+              <a:lnSpc>
+                <a:spcPct val="95000"/>
+              </a:lnSpc>
+            </a:pPr>
+            <a:r>
+              <a:rPr lang="en-US" sz="1800" dirty="0"/>
+              <a:t>Without a doubt, football is the sporting event that gathers more athletes</a:t>
+            </a:r>
+          </a:p>
+          <a:p>
+            <a:pPr marL="171450" indent="-171450" algn="l">
+              <a:lnSpc>
+                <a:spcPct val="95000"/>
+              </a:lnSpc>
+              <a:buFont typeface="Arial" panose="020B0604020202020204" pitchFamily="34" charset="0"/>
+              <a:buChar char="•"/>
+            </a:pPr>
+            <a:r>
+              <a:rPr lang="en-US" sz="1800" b="1" dirty="0"/>
+              <a:t>In which year were the most gold medals awarded?</a:t>
+            </a:r>
+          </a:p>
+          <a:p>
+            <a:pPr algn="l">
+              <a:lnSpc>
+                <a:spcPct val="95000"/>
+              </a:lnSpc>
+            </a:pPr>
+            <a:r>
+              <a:rPr lang="en-US" sz="1800" dirty="0"/>
+              <a:t>I believe that more gold medals were awarded between the years 2006 to 2010</a:t>
+            </a:r>
+          </a:p>
+          <a:p>
+            <a:pPr marL="171450" indent="-171450" algn="l">
+              <a:lnSpc>
+                <a:spcPct val="95000"/>
+              </a:lnSpc>
+              <a:buFont typeface="Arial" panose="020B0604020202020204" pitchFamily="34" charset="0"/>
+              <a:buChar char="•"/>
+            </a:pPr>
+            <a:r>
+              <a:rPr lang="en-US" sz="1800" b="1" dirty="0"/>
+              <a:t>In the 120 years of the Olympic Games, which country's team won the most medals?</a:t>
+            </a:r>
+          </a:p>
+          <a:p>
+            <a:pPr algn="l">
+              <a:lnSpc>
+                <a:spcPct val="95000"/>
+              </a:lnSpc>
+            </a:pPr>
+            <a:r>
+              <a:rPr lang="en-US" sz="1800" dirty="0"/>
+              <a:t>From my perspective, Poland has more medals</a:t>
+            </a:r>
+          </a:p>
+          <a:p>
+            <a:pPr marL="171450" indent="-171450" algn="l">
+              <a:lnSpc>
+                <a:spcPct val="95000"/>
+              </a:lnSpc>
+              <a:buFont typeface="Arial" panose="020B0604020202020204" pitchFamily="34" charset="0"/>
+              <a:buChar char="•"/>
+            </a:pPr>
+            <a:r>
+              <a:rPr lang="en-US" sz="1800" b="1" dirty="0"/>
+              <a:t>Which sport wins the most gold medals?</a:t>
+            </a:r>
+          </a:p>
+          <a:p>
+            <a:pPr algn="l">
+              <a:lnSpc>
+                <a:spcPct val="95000"/>
+              </a:lnSpc>
+            </a:pPr>
+            <a:r>
+              <a:rPr lang="en-US" sz="1800" dirty="0"/>
+              <a:t>I believe that the sport that has won the most gold medals in the 120 years of the Olympics is Boxing</a:t>
+            </a:r>
+          </a:p>
+          <a:p>
+            <a:pPr algn="l">
+              <a:lnSpc>
+                <a:spcPct val="95000"/>
+              </a:lnSpc>
+            </a:pPr>
+            <a:endParaRPr lang="es-PE" sz="1700" dirty="0"/>
+          </a:p>
+        </p:txBody>
+      </p:sp>
+      <p:pic>
+        <p:nvPicPr>
+          <p:cNvPr id="14" name="Picture 3">
+            <a:extLst>
+              <a:ext uri="{FF2B5EF4-FFF2-40B4-BE49-F238E27FC236}">
+                <a16:creationId xmlns:a16="http://schemas.microsoft.com/office/drawing/2014/main" id="{F5790F0F-A2D0-4309-9807-1E5BE0E64FC6}"/>
+              </a:ext>
+            </a:extLst>
+          </p:cNvPr>
+          <p:cNvPicPr>
+            <a:picLocks noChangeAspect="1"/>
+          </p:cNvPicPr>
+          <p:nvPr/>
+        </p:nvPicPr>
+        <p:blipFill rotWithShape="1">
+          <a:blip r:embed="rId2"/>
+          <a:srcRect l="40896"/>
+          <a:stretch/>
+        </p:blipFill>
+        <p:spPr>
+          <a:xfrm>
+            <a:off x="20" y="10"/>
+            <a:ext cx="5404493" cy="6857990"/>
+          </a:xfrm>
+          <a:prstGeom prst="rect">
+            <a:avLst/>
+          </a:prstGeom>
+        </p:spPr>
+      </p:pic>
+    </p:spTree>
+    <p:extLst>
+      <p:ext uri="{BB962C8B-B14F-4D97-AF65-F5344CB8AC3E}">
+        <p14:creationId xmlns:p14="http://schemas.microsoft.com/office/powerpoint/2010/main" val="2607506410"/>
+      </p:ext>
+    </p:extLst>
+  </p:cSld>
+  <p:clrMapOvr>
+    <a:masterClrMapping/>
+  </p:clrMapOvr>
+</p:sld>
+</file>
+
+<file path=ppt/slides/slide12.xml><?xml version="1.0" encoding="utf-8"?>
+<p:sld xmlns:a="http://schemas.openxmlformats.org/drawingml/2006/main" xmlns:r="http://schemas.openxmlformats.org/officeDocument/2006/relationships" xmlns:p="http://schemas.openxmlformats.org/presentationml/2006/main">
+  <p:cSld>
+    <p:bg>
+      <p:bgPr>
+        <a:solidFill>
+          <a:schemeClr val="bg1"/>
+        </a:solidFill>
+        <a:effectLst/>
+      </p:bgPr>
+    </p:bg>
+    <p:spTree>
+      <p:nvGrpSpPr>
+        <p:cNvPr id="1" name=""/>
+        <p:cNvGrpSpPr/>
+        <p:nvPr/>
+      </p:nvGrpSpPr>
+      <p:grpSpPr>
+        <a:xfrm>
+          <a:off x="0" y="0"/>
+          <a:ext cx="0" cy="0"/>
+          <a:chOff x="0" y="0"/>
+          <a:chExt cx="0" cy="0"/>
+        </a:xfrm>
+      </p:grpSpPr>
+      <p:sp>
+        <p:nvSpPr>
+          <p:cNvPr id="24" name="Freeform: Shape 23">
             <a:extLst>
               <a:ext uri="{FF2B5EF4-FFF2-40B4-BE49-F238E27FC236}">
                 <a16:creationId xmlns:a16="http://schemas.microsoft.com/office/drawing/2014/main" id="{49306479-8C4D-4E4A-A330-DFC80A8A01BE}"/>
@@ -4432,7 +4791,7 @@
       </p:sp>
       <p:sp useBgFill="1">
         <p:nvSpPr>
-          <p:cNvPr id="32" name="Rectangle 31">
+          <p:cNvPr id="26" name="Rectangle 25">
             <a:extLst>
               <a:ext uri="{FF2B5EF4-FFF2-40B4-BE49-F238E27FC236}">
                 <a16:creationId xmlns:a16="http://schemas.microsoft.com/office/drawing/2014/main" id="{84136905-015B-4510-B514-027CBA846BD6}"/>
@@ -4520,713 +4879,6 @@
           <a:p>
             <a:pPr algn="l"/>
             <a:r>
-              <a:rPr lang="en-US" sz="2900" kern="1200" spc="-50" baseline="0">
-                <a:solidFill>
-                  <a:schemeClr val="tx1"/>
-                </a:solidFill>
-                <a:latin typeface="+mj-lt"/>
-                <a:ea typeface="+mj-ea"/>
-                <a:cs typeface="+mj-cs"/>
-              </a:rPr>
-              <a:t>Section 1: Questions to Answer</a:t>
-            </a:r>
-          </a:p>
-        </p:txBody>
-      </p:sp>
-      <p:sp>
-        <p:nvSpPr>
-          <p:cNvPr id="3" name="Subtítulo 2">
-            <a:extLst>
-              <a:ext uri="{FF2B5EF4-FFF2-40B4-BE49-F238E27FC236}">
-                <a16:creationId xmlns:a16="http://schemas.microsoft.com/office/drawing/2014/main" id="{13784A56-64CD-4842-BFFE-CAB25B8F73AC}"/>
-              </a:ext>
-            </a:extLst>
-          </p:cNvPr>
-          <p:cNvSpPr>
-            <a:spLocks noGrp="1"/>
-          </p:cNvSpPr>
-          <p:nvPr>
-            <p:ph type="subTitle" idx="1"/>
-          </p:nvPr>
-        </p:nvSpPr>
-        <p:spPr>
-          <a:xfrm>
-            <a:off x="762001" y="2207969"/>
-            <a:ext cx="3932830" cy="3884983"/>
-          </a:xfrm>
-        </p:spPr>
-        <p:txBody>
-          <a:bodyPr vert="horz" lIns="91440" tIns="45720" rIns="91440" bIns="45720" rtlCol="0">
-            <a:normAutofit/>
-          </a:bodyPr>
-          <a:lstStyle/>
-          <a:p>
-            <a:pPr marL="171450" indent="-171450" algn="l">
-              <a:lnSpc>
-                <a:spcPct val="95000"/>
-              </a:lnSpc>
-              <a:buFont typeface="Arial" panose="020B0604020202020204" pitchFamily="34" charset="0"/>
-              <a:buChar char="•"/>
-            </a:pPr>
-            <a:r>
-              <a:rPr lang="en-US" sz="1700" b="1" dirty="0"/>
-              <a:t>Does the age of an athlete influence the performance for the delivery of a medal?</a:t>
-            </a:r>
-          </a:p>
-          <a:p>
-            <a:pPr marL="171450" indent="-171450" algn="l">
-              <a:lnSpc>
-                <a:spcPct val="95000"/>
-              </a:lnSpc>
-              <a:buFont typeface="Arial" panose="020B0604020202020204" pitchFamily="34" charset="0"/>
-              <a:buChar char="•"/>
-            </a:pPr>
-            <a:r>
-              <a:rPr lang="en-US" sz="1700" b="1" dirty="0"/>
-              <a:t>Which sporting event gathered the most athletes?</a:t>
-            </a:r>
-          </a:p>
-          <a:p>
-            <a:pPr marL="171450" indent="-171450" algn="l">
-              <a:lnSpc>
-                <a:spcPct val="95000"/>
-              </a:lnSpc>
-              <a:buFont typeface="Arial" panose="020B0604020202020204" pitchFamily="34" charset="0"/>
-              <a:buChar char="•"/>
-            </a:pPr>
-            <a:r>
-              <a:rPr lang="en-US" sz="1700" b="1" dirty="0"/>
-              <a:t>In which year were the most gold medals awarded?</a:t>
-            </a:r>
-          </a:p>
-          <a:p>
-            <a:pPr marL="171450" indent="-171450" algn="l">
-              <a:lnSpc>
-                <a:spcPct val="95000"/>
-              </a:lnSpc>
-              <a:buFont typeface="Arial" panose="020B0604020202020204" pitchFamily="34" charset="0"/>
-              <a:buChar char="•"/>
-            </a:pPr>
-            <a:r>
-              <a:rPr lang="en-US" sz="1700" b="1" dirty="0"/>
-              <a:t>In the 120 years of the Olympic Games, which country's team won the most medals?</a:t>
-            </a:r>
-          </a:p>
-          <a:p>
-            <a:pPr marL="171450" indent="-171450" algn="l">
-              <a:lnSpc>
-                <a:spcPct val="95000"/>
-              </a:lnSpc>
-              <a:buFont typeface="Arial" panose="020B0604020202020204" pitchFamily="34" charset="0"/>
-              <a:buChar char="•"/>
-            </a:pPr>
-            <a:r>
-              <a:rPr lang="en-US" sz="1700" b="1" dirty="0"/>
-              <a:t>Which sport wins the most gold medals?</a:t>
-            </a:r>
-          </a:p>
-        </p:txBody>
-      </p:sp>
-      <p:pic>
-        <p:nvPicPr>
-          <p:cNvPr id="14" name="Picture 3">
-            <a:extLst>
-              <a:ext uri="{FF2B5EF4-FFF2-40B4-BE49-F238E27FC236}">
-                <a16:creationId xmlns:a16="http://schemas.microsoft.com/office/drawing/2014/main" id="{F5790F0F-A2D0-4309-9807-1E5BE0E64FC6}"/>
-              </a:ext>
-            </a:extLst>
-          </p:cNvPr>
-          <p:cNvPicPr>
-            <a:picLocks noChangeAspect="1"/>
-          </p:cNvPicPr>
-          <p:nvPr/>
-        </p:nvPicPr>
-        <p:blipFill rotWithShape="1">
-          <a:blip r:embed="rId2"/>
-          <a:srcRect l="14335" r="-1" b="-1"/>
-          <a:stretch/>
-        </p:blipFill>
-        <p:spPr>
-          <a:xfrm>
-            <a:off x="5401464" y="786812"/>
-            <a:ext cx="6035826" cy="5284375"/>
-          </a:xfrm>
-          <a:prstGeom prst="rect">
-            <a:avLst/>
-          </a:prstGeom>
-        </p:spPr>
-      </p:pic>
-    </p:spTree>
-    <p:extLst>
-      <p:ext uri="{BB962C8B-B14F-4D97-AF65-F5344CB8AC3E}">
-        <p14:creationId xmlns:p14="http://schemas.microsoft.com/office/powerpoint/2010/main" val="702693780"/>
-      </p:ext>
-    </p:extLst>
-  </p:cSld>
-  <p:clrMapOvr>
-    <a:masterClrMapping/>
-  </p:clrMapOvr>
-</p:sld>
-</file>
-
-<file path=ppt/slides/slide4.xml><?xml version="1.0" encoding="utf-8"?>
-<p:sld xmlns:a="http://schemas.openxmlformats.org/drawingml/2006/main" xmlns:r="http://schemas.openxmlformats.org/officeDocument/2006/relationships" xmlns:p="http://schemas.openxmlformats.org/presentationml/2006/main">
-  <p:cSld>
-    <p:bg>
-      <p:bgPr>
-        <a:solidFill>
-          <a:schemeClr val="bg1"/>
-        </a:solidFill>
-        <a:effectLst/>
-      </p:bgPr>
-    </p:bg>
-    <p:spTree>
-      <p:nvGrpSpPr>
-        <p:cNvPr id="1" name=""/>
-        <p:cNvGrpSpPr/>
-        <p:nvPr/>
-      </p:nvGrpSpPr>
-      <p:grpSpPr>
-        <a:xfrm>
-          <a:off x="0" y="0"/>
-          <a:ext cx="0" cy="0"/>
-          <a:chOff x="0" y="0"/>
-          <a:chExt cx="0" cy="0"/>
-        </a:xfrm>
-      </p:grpSpPr>
-      <p:sp useBgFill="1">
-        <p:nvSpPr>
-          <p:cNvPr id="13" name="Rectangle 8">
-            <a:extLst>
-              <a:ext uri="{FF2B5EF4-FFF2-40B4-BE49-F238E27FC236}">
-                <a16:creationId xmlns:a16="http://schemas.microsoft.com/office/drawing/2014/main" id="{9B45BA4C-9B54-4496-821F-9E0985CA984D}"/>
-              </a:ext>
-              <a:ext uri="{C183D7F6-B498-43B3-948B-1728B52AA6E4}">
-                <adec:decorative xmlns:adec="http://schemas.microsoft.com/office/drawing/2017/decorative" val="1"/>
-              </a:ext>
-            </a:extLst>
-          </p:cNvPr>
-          <p:cNvSpPr>
-            <a:spLocks noGrp="1" noRot="1" noChangeAspect="1" noMove="1" noResize="1" noEditPoints="1" noAdjustHandles="1" noChangeArrowheads="1" noChangeShapeType="1" noTextEdit="1"/>
-          </p:cNvSpPr>
-          <p:nvPr>
-            <p:extLst>
-              <p:ext uri="{386F3935-93C4-4BCD-93E2-E3B085C9AB24}">
-                <p16:designElem xmlns:p16="http://schemas.microsoft.com/office/powerpoint/2015/main" val="1"/>
-              </p:ext>
-            </p:extLst>
-          </p:nvPr>
-        </p:nvSpPr>
-        <p:spPr>
-          <a:xfrm>
-            <a:off x="0" y="0"/>
-            <a:ext cx="12192000" cy="6858000"/>
-          </a:xfrm>
-          <a:prstGeom prst="rect">
-            <a:avLst/>
-          </a:prstGeom>
-          <a:ln>
-            <a:noFill/>
-          </a:ln>
-        </p:spPr>
-        <p:style>
-          <a:lnRef idx="2">
-            <a:schemeClr val="accent1">
-              <a:shade val="50000"/>
-            </a:schemeClr>
-          </a:lnRef>
-          <a:fillRef idx="1">
-            <a:schemeClr val="accent1"/>
-          </a:fillRef>
-          <a:effectRef idx="0">
-            <a:schemeClr val="accent1"/>
-          </a:effectRef>
-          <a:fontRef idx="minor">
-            <a:schemeClr val="lt1"/>
-          </a:fontRef>
-        </p:style>
-        <p:txBody>
-          <a:bodyPr rtlCol="0" anchor="ctr"/>
-          <a:lstStyle/>
-          <a:p>
-            <a:pPr algn="ctr"/>
-            <a:endParaRPr lang="en-US"/>
-          </a:p>
-        </p:txBody>
-      </p:sp>
-      <p:sp>
-        <p:nvSpPr>
-          <p:cNvPr id="2" name="Título 1">
-            <a:extLst>
-              <a:ext uri="{FF2B5EF4-FFF2-40B4-BE49-F238E27FC236}">
-                <a16:creationId xmlns:a16="http://schemas.microsoft.com/office/drawing/2014/main" id="{92B69FF4-5F8D-4B10-BAEC-4C2B411385B5}"/>
-              </a:ext>
-            </a:extLst>
-          </p:cNvPr>
-          <p:cNvSpPr>
-            <a:spLocks noGrp="1"/>
-          </p:cNvSpPr>
-          <p:nvPr>
-            <p:ph type="ctrTitle"/>
-          </p:nvPr>
-        </p:nvSpPr>
-        <p:spPr>
-          <a:xfrm>
-            <a:off x="6047979" y="375958"/>
-            <a:ext cx="5068121" cy="3053042"/>
-          </a:xfrm>
-        </p:spPr>
-        <p:txBody>
-          <a:bodyPr anchor="ctr">
-            <a:normAutofit/>
-          </a:bodyPr>
-          <a:lstStyle/>
-          <a:p>
-            <a:pPr algn="l"/>
-            <a:r>
-              <a:rPr lang="es-PE" dirty="0" err="1"/>
-              <a:t>Section</a:t>
-            </a:r>
-            <a:r>
-              <a:rPr lang="es-PE" dirty="0"/>
-              <a:t> 2: </a:t>
-            </a:r>
-            <a:r>
-              <a:rPr lang="es-PE" dirty="0" err="1"/>
-              <a:t>Initial</a:t>
-            </a:r>
-            <a:r>
-              <a:rPr lang="es-PE" dirty="0"/>
-              <a:t> </a:t>
-            </a:r>
-            <a:r>
-              <a:rPr lang="es-PE" dirty="0" err="1"/>
-              <a:t>Hyphothesis</a:t>
-            </a:r>
-            <a:endParaRPr lang="es-PE" dirty="0"/>
-          </a:p>
-        </p:txBody>
-      </p:sp>
-      <p:sp>
-        <p:nvSpPr>
-          <p:cNvPr id="3" name="Subtítulo 2">
-            <a:extLst>
-              <a:ext uri="{FF2B5EF4-FFF2-40B4-BE49-F238E27FC236}">
-                <a16:creationId xmlns:a16="http://schemas.microsoft.com/office/drawing/2014/main" id="{13784A56-64CD-4842-BFFE-CAB25B8F73AC}"/>
-              </a:ext>
-            </a:extLst>
-          </p:cNvPr>
-          <p:cNvSpPr>
-            <a:spLocks noGrp="1"/>
-          </p:cNvSpPr>
-          <p:nvPr>
-            <p:ph type="subTitle" idx="1"/>
-          </p:nvPr>
-        </p:nvSpPr>
-        <p:spPr>
-          <a:xfrm>
-            <a:off x="6096000" y="3804958"/>
-            <a:ext cx="5404493" cy="2291042"/>
-          </a:xfrm>
-        </p:spPr>
-        <p:txBody>
-          <a:bodyPr>
-            <a:normAutofit fontScale="85000" lnSpcReduction="10000"/>
-          </a:bodyPr>
-          <a:lstStyle/>
-          <a:p>
-            <a:pPr marL="171450" indent="-171450" algn="l">
-              <a:lnSpc>
-                <a:spcPct val="95000"/>
-              </a:lnSpc>
-              <a:buFont typeface="Arial" panose="020B0604020202020204" pitchFamily="34" charset="0"/>
-              <a:buChar char="•"/>
-            </a:pPr>
-            <a:r>
-              <a:rPr lang="en-US" sz="1800" b="1" dirty="0"/>
-              <a:t>Does the age of an athlete influence the performance for the delivery of a medal?</a:t>
-            </a:r>
-          </a:p>
-          <a:p>
-            <a:pPr marL="171450" indent="-171450" algn="l">
-              <a:lnSpc>
-                <a:spcPct val="95000"/>
-              </a:lnSpc>
-              <a:buFont typeface="Arial" panose="020B0604020202020204" pitchFamily="34" charset="0"/>
-              <a:buChar char="•"/>
-            </a:pPr>
-            <a:r>
-              <a:rPr lang="en-US" sz="1800" b="1" dirty="0"/>
-              <a:t>Which sporting event gathered the most athletes?</a:t>
-            </a:r>
-          </a:p>
-          <a:p>
-            <a:pPr marL="171450" indent="-171450" algn="l">
-              <a:lnSpc>
-                <a:spcPct val="95000"/>
-              </a:lnSpc>
-              <a:buFont typeface="Arial" panose="020B0604020202020204" pitchFamily="34" charset="0"/>
-              <a:buChar char="•"/>
-            </a:pPr>
-            <a:r>
-              <a:rPr lang="en-US" sz="1800" b="1" dirty="0"/>
-              <a:t>In which year were the most gold medals awarded?</a:t>
-            </a:r>
-          </a:p>
-          <a:p>
-            <a:pPr marL="171450" indent="-171450" algn="l">
-              <a:lnSpc>
-                <a:spcPct val="95000"/>
-              </a:lnSpc>
-              <a:buFont typeface="Arial" panose="020B0604020202020204" pitchFamily="34" charset="0"/>
-              <a:buChar char="•"/>
-            </a:pPr>
-            <a:r>
-              <a:rPr lang="en-US" sz="1800" b="1" dirty="0"/>
-              <a:t>In the 120 years of the Olympic Games, which country's team won the most medals?</a:t>
-            </a:r>
-          </a:p>
-          <a:p>
-            <a:pPr marL="171450" indent="-171450" algn="l">
-              <a:lnSpc>
-                <a:spcPct val="95000"/>
-              </a:lnSpc>
-              <a:buFont typeface="Arial" panose="020B0604020202020204" pitchFamily="34" charset="0"/>
-              <a:buChar char="•"/>
-            </a:pPr>
-            <a:r>
-              <a:rPr lang="en-US" sz="1800" b="1" dirty="0"/>
-              <a:t>Which sport wins the most gold medals?</a:t>
-            </a:r>
-          </a:p>
-          <a:p>
-            <a:pPr algn="l">
-              <a:lnSpc>
-                <a:spcPct val="95000"/>
-              </a:lnSpc>
-            </a:pPr>
-            <a:endParaRPr lang="es-PE" sz="1700" dirty="0"/>
-          </a:p>
-        </p:txBody>
-      </p:sp>
-      <p:pic>
-        <p:nvPicPr>
-          <p:cNvPr id="14" name="Picture 3">
-            <a:extLst>
-              <a:ext uri="{FF2B5EF4-FFF2-40B4-BE49-F238E27FC236}">
-                <a16:creationId xmlns:a16="http://schemas.microsoft.com/office/drawing/2014/main" id="{F5790F0F-A2D0-4309-9807-1E5BE0E64FC6}"/>
-              </a:ext>
-            </a:extLst>
-          </p:cNvPr>
-          <p:cNvPicPr>
-            <a:picLocks noChangeAspect="1"/>
-          </p:cNvPicPr>
-          <p:nvPr/>
-        </p:nvPicPr>
-        <p:blipFill rotWithShape="1">
-          <a:blip r:embed="rId2"/>
-          <a:srcRect l="40896"/>
-          <a:stretch/>
-        </p:blipFill>
-        <p:spPr>
-          <a:xfrm>
-            <a:off x="20" y="10"/>
-            <a:ext cx="5404493" cy="6857990"/>
-          </a:xfrm>
-          <a:prstGeom prst="rect">
-            <a:avLst/>
-          </a:prstGeom>
-        </p:spPr>
-      </p:pic>
-    </p:spTree>
-    <p:extLst>
-      <p:ext uri="{BB962C8B-B14F-4D97-AF65-F5344CB8AC3E}">
-        <p14:creationId xmlns:p14="http://schemas.microsoft.com/office/powerpoint/2010/main" val="2607506410"/>
-      </p:ext>
-    </p:extLst>
-  </p:cSld>
-  <p:clrMapOvr>
-    <a:masterClrMapping/>
-  </p:clrMapOvr>
-</p:sld>
-</file>
-
-<file path=ppt/slides/slide5.xml><?xml version="1.0" encoding="utf-8"?>
-<p:sld xmlns:a="http://schemas.openxmlformats.org/drawingml/2006/main" xmlns:r="http://schemas.openxmlformats.org/officeDocument/2006/relationships" xmlns:p="http://schemas.openxmlformats.org/presentationml/2006/main">
-  <p:cSld>
-    <p:bg>
-      <p:bgPr>
-        <a:solidFill>
-          <a:schemeClr val="bg1"/>
-        </a:solidFill>
-        <a:effectLst/>
-      </p:bgPr>
-    </p:bg>
-    <p:spTree>
-      <p:nvGrpSpPr>
-        <p:cNvPr id="1" name=""/>
-        <p:cNvGrpSpPr/>
-        <p:nvPr/>
-      </p:nvGrpSpPr>
-      <p:grpSpPr>
-        <a:xfrm>
-          <a:off x="0" y="0"/>
-          <a:ext cx="0" cy="0"/>
-          <a:chOff x="0" y="0"/>
-          <a:chExt cx="0" cy="0"/>
-        </a:xfrm>
-      </p:grpSpPr>
-      <p:sp>
-        <p:nvSpPr>
-          <p:cNvPr id="24" name="Freeform: Shape 23">
-            <a:extLst>
-              <a:ext uri="{FF2B5EF4-FFF2-40B4-BE49-F238E27FC236}">
-                <a16:creationId xmlns:a16="http://schemas.microsoft.com/office/drawing/2014/main" id="{49306479-8C4D-4E4A-A330-DFC80A8A01BE}"/>
-              </a:ext>
-              <a:ext uri="{C183D7F6-B498-43B3-948B-1728B52AA6E4}">
-                <adec:decorative xmlns:adec="http://schemas.microsoft.com/office/drawing/2017/decorative" val="1"/>
-              </a:ext>
-            </a:extLst>
-          </p:cNvPr>
-          <p:cNvSpPr>
-            <a:spLocks noGrp="1" noRot="1" noChangeAspect="1" noMove="1" noResize="1" noEditPoints="1" noAdjustHandles="1" noChangeArrowheads="1" noChangeShapeType="1" noTextEdit="1"/>
-          </p:cNvSpPr>
-          <p:nvPr>
-            <p:extLst>
-              <p:ext uri="{386F3935-93C4-4BCD-93E2-E3B085C9AB24}">
-                <p16:designElem xmlns:p16="http://schemas.microsoft.com/office/powerpoint/2015/main" val="1"/>
-              </p:ext>
-            </p:extLst>
-          </p:nvPr>
-        </p:nvSpPr>
-        <p:spPr>
-          <a:xfrm>
-            <a:off x="0" y="0"/>
-            <a:ext cx="12192000" cy="6105524"/>
-          </a:xfrm>
-          <a:custGeom>
-            <a:avLst/>
-            <a:gdLst>
-              <a:gd name="connsiteX0" fmla="*/ 0 w 12192000"/>
-              <a:gd name="connsiteY0" fmla="*/ 0 h 6105524"/>
-              <a:gd name="connsiteX1" fmla="*/ 12192000 w 12192000"/>
-              <a:gd name="connsiteY1" fmla="*/ 0 h 6105524"/>
-              <a:gd name="connsiteX2" fmla="*/ 12192000 w 12192000"/>
-              <a:gd name="connsiteY2" fmla="*/ 6105524 h 6105524"/>
-              <a:gd name="connsiteX3" fmla="*/ 11435080 w 12192000"/>
-              <a:gd name="connsiteY3" fmla="*/ 6105524 h 6105524"/>
-              <a:gd name="connsiteX4" fmla="*/ 11435080 w 12192000"/>
-              <a:gd name="connsiteY4" fmla="*/ 771523 h 6105524"/>
-              <a:gd name="connsiteX5" fmla="*/ 767080 w 12192000"/>
-              <a:gd name="connsiteY5" fmla="*/ 771523 h 6105524"/>
-              <a:gd name="connsiteX6" fmla="*/ 767080 w 12192000"/>
-              <a:gd name="connsiteY6" fmla="*/ 6105524 h 6105524"/>
-              <a:gd name="connsiteX7" fmla="*/ 0 w 12192000"/>
-              <a:gd name="connsiteY7" fmla="*/ 6105524 h 6105524"/>
-            </a:gdLst>
-            <a:ahLst/>
-            <a:cxnLst>
-              <a:cxn ang="0">
-                <a:pos x="connsiteX0" y="connsiteY0"/>
-              </a:cxn>
-              <a:cxn ang="0">
-                <a:pos x="connsiteX1" y="connsiteY1"/>
-              </a:cxn>
-              <a:cxn ang="0">
-                <a:pos x="connsiteX2" y="connsiteY2"/>
-              </a:cxn>
-              <a:cxn ang="0">
-                <a:pos x="connsiteX3" y="connsiteY3"/>
-              </a:cxn>
-              <a:cxn ang="0">
-                <a:pos x="connsiteX4" y="connsiteY4"/>
-              </a:cxn>
-              <a:cxn ang="0">
-                <a:pos x="connsiteX5" y="connsiteY5"/>
-              </a:cxn>
-              <a:cxn ang="0">
-                <a:pos x="connsiteX6" y="connsiteY6"/>
-              </a:cxn>
-              <a:cxn ang="0">
-                <a:pos x="connsiteX7" y="connsiteY7"/>
-              </a:cxn>
-            </a:cxnLst>
-            <a:rect l="l" t="t" r="r" b="b"/>
-            <a:pathLst>
-              <a:path w="12192000" h="6105524">
-                <a:moveTo>
-                  <a:pt x="0" y="0"/>
-                </a:moveTo>
-                <a:lnTo>
-                  <a:pt x="12192000" y="0"/>
-                </a:lnTo>
-                <a:lnTo>
-                  <a:pt x="12192000" y="6105524"/>
-                </a:lnTo>
-                <a:lnTo>
-                  <a:pt x="11435080" y="6105524"/>
-                </a:lnTo>
-                <a:lnTo>
-                  <a:pt x="11435080" y="771523"/>
-                </a:lnTo>
-                <a:lnTo>
-                  <a:pt x="767080" y="771523"/>
-                </a:lnTo>
-                <a:lnTo>
-                  <a:pt x="767080" y="6105524"/>
-                </a:lnTo>
-                <a:lnTo>
-                  <a:pt x="0" y="6105524"/>
-                </a:lnTo>
-                <a:close/>
-              </a:path>
-            </a:pathLst>
-          </a:custGeom>
-          <a:gradFill flip="none" rotWithShape="1">
-            <a:gsLst>
-              <a:gs pos="10000">
-                <a:schemeClr val="accent5"/>
-              </a:gs>
-              <a:gs pos="90000">
-                <a:schemeClr val="accent1"/>
-              </a:gs>
-              <a:gs pos="70000">
-                <a:schemeClr val="accent2"/>
-              </a:gs>
-              <a:gs pos="30000">
-                <a:schemeClr val="accent4"/>
-              </a:gs>
-              <a:gs pos="50000">
-                <a:schemeClr val="accent3">
-                  <a:lumMod val="60000"/>
-                  <a:lumOff val="40000"/>
-                </a:schemeClr>
-              </a:gs>
-            </a:gsLst>
-            <a:lin ang="7200000" scaled="0"/>
-            <a:tileRect/>
-          </a:gradFill>
-          <a:ln>
-            <a:noFill/>
-          </a:ln>
-        </p:spPr>
-        <p:style>
-          <a:lnRef idx="2">
-            <a:schemeClr val="accent1">
-              <a:shade val="50000"/>
-            </a:schemeClr>
-          </a:lnRef>
-          <a:fillRef idx="1">
-            <a:schemeClr val="accent1"/>
-          </a:fillRef>
-          <a:effectRef idx="0">
-            <a:schemeClr val="accent1"/>
-          </a:effectRef>
-          <a:fontRef idx="minor">
-            <a:schemeClr val="lt1"/>
-          </a:fontRef>
-        </p:style>
-        <p:txBody>
-          <a:bodyPr wrap="square" rtlCol="0" anchor="ctr">
-            <a:noAutofit/>
-          </a:bodyPr>
-          <a:lstStyle/>
-          <a:p>
-            <a:pPr algn="ctr"/>
-            <a:endParaRPr lang="en-US"/>
-          </a:p>
-        </p:txBody>
-      </p:sp>
-      <p:sp useBgFill="1">
-        <p:nvSpPr>
-          <p:cNvPr id="26" name="Rectangle 25">
-            <a:extLst>
-              <a:ext uri="{FF2B5EF4-FFF2-40B4-BE49-F238E27FC236}">
-                <a16:creationId xmlns:a16="http://schemas.microsoft.com/office/drawing/2014/main" id="{84136905-015B-4510-B514-027CBA846BD6}"/>
-              </a:ext>
-              <a:ext uri="{C183D7F6-B498-43B3-948B-1728B52AA6E4}">
-                <adec:decorative xmlns:adec="http://schemas.microsoft.com/office/drawing/2017/decorative" val="1"/>
-              </a:ext>
-            </a:extLst>
-          </p:cNvPr>
-          <p:cNvSpPr>
-            <a:spLocks noGrp="1" noRot="1" noChangeAspect="1" noMove="1" noResize="1" noEditPoints="1" noAdjustHandles="1" noChangeArrowheads="1" noChangeShapeType="1" noTextEdit="1"/>
-          </p:cNvSpPr>
-          <p:nvPr>
-            <p:extLst>
-              <p:ext uri="{386F3935-93C4-4BCD-93E2-E3B085C9AB24}">
-                <p16:designElem xmlns:p16="http://schemas.microsoft.com/office/powerpoint/2015/main" val="1"/>
-              </p:ext>
-            </p:extLst>
-          </p:nvPr>
-        </p:nvSpPr>
-        <p:spPr>
-          <a:xfrm>
-            <a:off x="0" y="0"/>
-            <a:ext cx="12192000" cy="6858000"/>
-          </a:xfrm>
-          <a:prstGeom prst="rect">
-            <a:avLst/>
-          </a:prstGeom>
-          <a:ln>
-            <a:noFill/>
-          </a:ln>
-        </p:spPr>
-        <p:style>
-          <a:lnRef idx="2">
-            <a:schemeClr val="accent1">
-              <a:shade val="50000"/>
-            </a:schemeClr>
-          </a:lnRef>
-          <a:fillRef idx="1">
-            <a:schemeClr val="accent1"/>
-          </a:fillRef>
-          <a:effectRef idx="0">
-            <a:schemeClr val="accent1"/>
-          </a:effectRef>
-          <a:fontRef idx="minor">
-            <a:schemeClr val="lt1"/>
-          </a:fontRef>
-        </p:style>
-        <p:txBody>
-          <a:bodyPr rtlCol="0" anchor="ctr"/>
-          <a:lstStyle/>
-          <a:p>
-            <a:pPr algn="ctr"/>
-            <a:endParaRPr lang="en-US"/>
-          </a:p>
-        </p:txBody>
-      </p:sp>
-      <p:sp>
-        <p:nvSpPr>
-          <p:cNvPr id="2" name="Título 1">
-            <a:extLst>
-              <a:ext uri="{FF2B5EF4-FFF2-40B4-BE49-F238E27FC236}">
-                <a16:creationId xmlns:a16="http://schemas.microsoft.com/office/drawing/2014/main" id="{92B69FF4-5F8D-4B10-BAEC-4C2B411385B5}"/>
-              </a:ext>
-            </a:extLst>
-          </p:cNvPr>
-          <p:cNvSpPr>
-            <a:spLocks noGrp="1"/>
-          </p:cNvSpPr>
-          <p:nvPr>
-            <p:ph type="ctrTitle"/>
-          </p:nvPr>
-        </p:nvSpPr>
-        <p:spPr>
-          <a:xfrm>
-            <a:off x="762001" y="755650"/>
-            <a:ext cx="3932830" cy="1345115"/>
-          </a:xfrm>
-        </p:spPr>
-        <p:txBody>
-          <a:bodyPr vert="horz" lIns="91440" tIns="45720" rIns="91440" bIns="45720" rtlCol="0" anchor="t">
-            <a:normAutofit/>
-          </a:bodyPr>
-          <a:lstStyle/>
-          <a:p>
-            <a:pPr algn="l"/>
-            <a:r>
               <a:rPr lang="en-US" sz="3300" kern="1200" spc="-50" baseline="0" dirty="0">
                 <a:solidFill>
                   <a:schemeClr val="tx1"/>
@@ -5235,7 +4887,7 @@
                 <a:ea typeface="+mj-ea"/>
                 <a:cs typeface="+mj-cs"/>
               </a:rPr>
-              <a:t>Section 3: Data analysis Approach</a:t>
+              <a:t>Data analysis Approach</a:t>
             </a:r>
           </a:p>
         </p:txBody>
@@ -5601,6 +5253,1958 @@
       <p:bldP spid="2" grpId="0"/>
     </p:bldLst>
   </p:timing>
+</p:sld>
+</file>
+
+<file path=ppt/slides/slide2.xml><?xml version="1.0" encoding="utf-8"?>
+<p:sld xmlns:a="http://schemas.openxmlformats.org/drawingml/2006/main" xmlns:r="http://schemas.openxmlformats.org/officeDocument/2006/relationships" xmlns:p="http://schemas.openxmlformats.org/presentationml/2006/main">
+  <p:cSld>
+    <p:bg>
+      <p:bgPr>
+        <a:solidFill>
+          <a:schemeClr val="bg1"/>
+        </a:solidFill>
+        <a:effectLst/>
+      </p:bgPr>
+    </p:bg>
+    <p:spTree>
+      <p:nvGrpSpPr>
+        <p:cNvPr id="1" name=""/>
+        <p:cNvGrpSpPr/>
+        <p:nvPr/>
+      </p:nvGrpSpPr>
+      <p:grpSpPr>
+        <a:xfrm>
+          <a:off x="0" y="0"/>
+          <a:ext cx="0" cy="0"/>
+          <a:chOff x="0" y="0"/>
+          <a:chExt cx="0" cy="0"/>
+        </a:xfrm>
+      </p:grpSpPr>
+      <p:sp>
+        <p:nvSpPr>
+          <p:cNvPr id="19" name="Freeform: Shape 18">
+            <a:extLst>
+              <a:ext uri="{FF2B5EF4-FFF2-40B4-BE49-F238E27FC236}">
+                <a16:creationId xmlns:a16="http://schemas.microsoft.com/office/drawing/2014/main" id="{49306479-8C4D-4E4A-A330-DFC80A8A01BE}"/>
+              </a:ext>
+              <a:ext uri="{C183D7F6-B498-43B3-948B-1728B52AA6E4}">
+                <adec:decorative xmlns:adec="http://schemas.microsoft.com/office/drawing/2017/decorative" val="1"/>
+              </a:ext>
+            </a:extLst>
+          </p:cNvPr>
+          <p:cNvSpPr>
+            <a:spLocks noGrp="1" noRot="1" noChangeAspect="1" noMove="1" noResize="1" noEditPoints="1" noAdjustHandles="1" noChangeArrowheads="1" noChangeShapeType="1" noTextEdit="1"/>
+          </p:cNvSpPr>
+          <p:nvPr>
+            <p:extLst>
+              <p:ext uri="{386F3935-93C4-4BCD-93E2-E3B085C9AB24}">
+                <p16:designElem xmlns:p16="http://schemas.microsoft.com/office/powerpoint/2015/main" val="1"/>
+              </p:ext>
+            </p:extLst>
+          </p:nvPr>
+        </p:nvSpPr>
+        <p:spPr>
+          <a:xfrm>
+            <a:off x="0" y="0"/>
+            <a:ext cx="12192000" cy="6105524"/>
+          </a:xfrm>
+          <a:custGeom>
+            <a:avLst/>
+            <a:gdLst>
+              <a:gd name="connsiteX0" fmla="*/ 0 w 12192000"/>
+              <a:gd name="connsiteY0" fmla="*/ 0 h 6105524"/>
+              <a:gd name="connsiteX1" fmla="*/ 12192000 w 12192000"/>
+              <a:gd name="connsiteY1" fmla="*/ 0 h 6105524"/>
+              <a:gd name="connsiteX2" fmla="*/ 12192000 w 12192000"/>
+              <a:gd name="connsiteY2" fmla="*/ 6105524 h 6105524"/>
+              <a:gd name="connsiteX3" fmla="*/ 11435080 w 12192000"/>
+              <a:gd name="connsiteY3" fmla="*/ 6105524 h 6105524"/>
+              <a:gd name="connsiteX4" fmla="*/ 11435080 w 12192000"/>
+              <a:gd name="connsiteY4" fmla="*/ 771523 h 6105524"/>
+              <a:gd name="connsiteX5" fmla="*/ 767080 w 12192000"/>
+              <a:gd name="connsiteY5" fmla="*/ 771523 h 6105524"/>
+              <a:gd name="connsiteX6" fmla="*/ 767080 w 12192000"/>
+              <a:gd name="connsiteY6" fmla="*/ 6105524 h 6105524"/>
+              <a:gd name="connsiteX7" fmla="*/ 0 w 12192000"/>
+              <a:gd name="connsiteY7" fmla="*/ 6105524 h 6105524"/>
+            </a:gdLst>
+            <a:ahLst/>
+            <a:cxnLst>
+              <a:cxn ang="0">
+                <a:pos x="connsiteX0" y="connsiteY0"/>
+              </a:cxn>
+              <a:cxn ang="0">
+                <a:pos x="connsiteX1" y="connsiteY1"/>
+              </a:cxn>
+              <a:cxn ang="0">
+                <a:pos x="connsiteX2" y="connsiteY2"/>
+              </a:cxn>
+              <a:cxn ang="0">
+                <a:pos x="connsiteX3" y="connsiteY3"/>
+              </a:cxn>
+              <a:cxn ang="0">
+                <a:pos x="connsiteX4" y="connsiteY4"/>
+              </a:cxn>
+              <a:cxn ang="0">
+                <a:pos x="connsiteX5" y="connsiteY5"/>
+              </a:cxn>
+              <a:cxn ang="0">
+                <a:pos x="connsiteX6" y="connsiteY6"/>
+              </a:cxn>
+              <a:cxn ang="0">
+                <a:pos x="connsiteX7" y="connsiteY7"/>
+              </a:cxn>
+            </a:cxnLst>
+            <a:rect l="l" t="t" r="r" b="b"/>
+            <a:pathLst>
+              <a:path w="12192000" h="6105524">
+                <a:moveTo>
+                  <a:pt x="0" y="0"/>
+                </a:moveTo>
+                <a:lnTo>
+                  <a:pt x="12192000" y="0"/>
+                </a:lnTo>
+                <a:lnTo>
+                  <a:pt x="12192000" y="6105524"/>
+                </a:lnTo>
+                <a:lnTo>
+                  <a:pt x="11435080" y="6105524"/>
+                </a:lnTo>
+                <a:lnTo>
+                  <a:pt x="11435080" y="771523"/>
+                </a:lnTo>
+                <a:lnTo>
+                  <a:pt x="767080" y="771523"/>
+                </a:lnTo>
+                <a:lnTo>
+                  <a:pt x="767080" y="6105524"/>
+                </a:lnTo>
+                <a:lnTo>
+                  <a:pt x="0" y="6105524"/>
+                </a:lnTo>
+                <a:close/>
+              </a:path>
+            </a:pathLst>
+          </a:custGeom>
+          <a:gradFill flip="none" rotWithShape="1">
+            <a:gsLst>
+              <a:gs pos="10000">
+                <a:schemeClr val="accent5"/>
+              </a:gs>
+              <a:gs pos="90000">
+                <a:schemeClr val="accent1"/>
+              </a:gs>
+              <a:gs pos="70000">
+                <a:schemeClr val="accent2"/>
+              </a:gs>
+              <a:gs pos="30000">
+                <a:schemeClr val="accent4"/>
+              </a:gs>
+              <a:gs pos="50000">
+                <a:schemeClr val="accent3">
+                  <a:lumMod val="60000"/>
+                  <a:lumOff val="40000"/>
+                </a:schemeClr>
+              </a:gs>
+            </a:gsLst>
+            <a:lin ang="7200000" scaled="0"/>
+            <a:tileRect/>
+          </a:gradFill>
+          <a:ln>
+            <a:noFill/>
+          </a:ln>
+        </p:spPr>
+        <p:style>
+          <a:lnRef idx="2">
+            <a:schemeClr val="accent1">
+              <a:shade val="50000"/>
+            </a:schemeClr>
+          </a:lnRef>
+          <a:fillRef idx="1">
+            <a:schemeClr val="accent1"/>
+          </a:fillRef>
+          <a:effectRef idx="0">
+            <a:schemeClr val="accent1"/>
+          </a:effectRef>
+          <a:fontRef idx="minor">
+            <a:schemeClr val="lt1"/>
+          </a:fontRef>
+        </p:style>
+        <p:txBody>
+          <a:bodyPr wrap="square" rtlCol="0" anchor="ctr">
+            <a:noAutofit/>
+          </a:bodyPr>
+          <a:lstStyle/>
+          <a:p>
+            <a:pPr algn="ctr"/>
+            <a:endParaRPr lang="en-US"/>
+          </a:p>
+        </p:txBody>
+      </p:sp>
+      <p:sp useBgFill="1">
+        <p:nvSpPr>
+          <p:cNvPr id="21" name="Rectangle 20">
+            <a:extLst>
+              <a:ext uri="{FF2B5EF4-FFF2-40B4-BE49-F238E27FC236}">
+                <a16:creationId xmlns:a16="http://schemas.microsoft.com/office/drawing/2014/main" id="{84136905-015B-4510-B514-027CBA846BD6}"/>
+              </a:ext>
+              <a:ext uri="{C183D7F6-B498-43B3-948B-1728B52AA6E4}">
+                <adec:decorative xmlns:adec="http://schemas.microsoft.com/office/drawing/2017/decorative" val="1"/>
+              </a:ext>
+            </a:extLst>
+          </p:cNvPr>
+          <p:cNvSpPr>
+            <a:spLocks noGrp="1" noRot="1" noChangeAspect="1" noMove="1" noResize="1" noEditPoints="1" noAdjustHandles="1" noChangeArrowheads="1" noChangeShapeType="1" noTextEdit="1"/>
+          </p:cNvSpPr>
+          <p:nvPr>
+            <p:extLst>
+              <p:ext uri="{386F3935-93C4-4BCD-93E2-E3B085C9AB24}">
+                <p16:designElem xmlns:p16="http://schemas.microsoft.com/office/powerpoint/2015/main" val="1"/>
+              </p:ext>
+            </p:extLst>
+          </p:nvPr>
+        </p:nvSpPr>
+        <p:spPr>
+          <a:xfrm>
+            <a:off x="0" y="0"/>
+            <a:ext cx="12192000" cy="6858000"/>
+          </a:xfrm>
+          <a:prstGeom prst="rect">
+            <a:avLst/>
+          </a:prstGeom>
+          <a:ln>
+            <a:noFill/>
+          </a:ln>
+        </p:spPr>
+        <p:style>
+          <a:lnRef idx="2">
+            <a:schemeClr val="accent1">
+              <a:shade val="50000"/>
+            </a:schemeClr>
+          </a:lnRef>
+          <a:fillRef idx="1">
+            <a:schemeClr val="accent1"/>
+          </a:fillRef>
+          <a:effectRef idx="0">
+            <a:schemeClr val="accent1"/>
+          </a:effectRef>
+          <a:fontRef idx="minor">
+            <a:schemeClr val="lt1"/>
+          </a:fontRef>
+        </p:style>
+        <p:txBody>
+          <a:bodyPr rtlCol="0" anchor="ctr"/>
+          <a:lstStyle/>
+          <a:p>
+            <a:pPr algn="ctr"/>
+            <a:endParaRPr lang="en-US"/>
+          </a:p>
+        </p:txBody>
+      </p:sp>
+      <p:sp>
+        <p:nvSpPr>
+          <p:cNvPr id="2" name="Título 1">
+            <a:extLst>
+              <a:ext uri="{FF2B5EF4-FFF2-40B4-BE49-F238E27FC236}">
+                <a16:creationId xmlns:a16="http://schemas.microsoft.com/office/drawing/2014/main" id="{92B69FF4-5F8D-4B10-BAEC-4C2B411385B5}"/>
+              </a:ext>
+            </a:extLst>
+          </p:cNvPr>
+          <p:cNvSpPr>
+            <a:spLocks noGrp="1"/>
+          </p:cNvSpPr>
+          <p:nvPr>
+            <p:ph type="ctrTitle"/>
+          </p:nvPr>
+        </p:nvSpPr>
+        <p:spPr>
+          <a:xfrm>
+            <a:off x="762000" y="758951"/>
+            <a:ext cx="3880511" cy="1577849"/>
+          </a:xfrm>
+        </p:spPr>
+        <p:txBody>
+          <a:bodyPr vert="horz" lIns="91440" tIns="45720" rIns="91440" bIns="45720" rtlCol="0" anchor="t">
+            <a:normAutofit/>
+          </a:bodyPr>
+          <a:lstStyle/>
+          <a:p>
+            <a:pPr algn="l"/>
+            <a:r>
+              <a:rPr lang="en-US" sz="4200" kern="1200" spc="-50" baseline="0">
+                <a:solidFill>
+                  <a:schemeClr val="tx1"/>
+                </a:solidFill>
+                <a:latin typeface="+mj-lt"/>
+                <a:ea typeface="+mj-ea"/>
+                <a:cs typeface="+mj-cs"/>
+              </a:rPr>
+              <a:t>Overview</a:t>
+            </a:r>
+          </a:p>
+        </p:txBody>
+      </p:sp>
+      <p:sp>
+        <p:nvSpPr>
+          <p:cNvPr id="3" name="Subtítulo 2">
+            <a:extLst>
+              <a:ext uri="{FF2B5EF4-FFF2-40B4-BE49-F238E27FC236}">
+                <a16:creationId xmlns:a16="http://schemas.microsoft.com/office/drawing/2014/main" id="{13784A56-64CD-4842-BFFE-CAB25B8F73AC}"/>
+              </a:ext>
+            </a:extLst>
+          </p:cNvPr>
+          <p:cNvSpPr>
+            <a:spLocks noGrp="1"/>
+          </p:cNvSpPr>
+          <p:nvPr>
+            <p:ph type="subTitle" idx="1"/>
+          </p:nvPr>
+        </p:nvSpPr>
+        <p:spPr>
+          <a:xfrm>
+            <a:off x="762000" y="1983544"/>
+            <a:ext cx="4822874" cy="4311150"/>
+          </a:xfrm>
+        </p:spPr>
+        <p:txBody>
+          <a:bodyPr vert="horz" lIns="91440" tIns="45720" rIns="91440" bIns="45720" rtlCol="0">
+            <a:normAutofit/>
+          </a:bodyPr>
+          <a:lstStyle/>
+          <a:p>
+            <a:pPr algn="l">
+              <a:lnSpc>
+                <a:spcPct val="95000"/>
+              </a:lnSpc>
+            </a:pPr>
+            <a:r>
+              <a:rPr lang="en-US" sz="1200" dirty="0"/>
+              <a:t>The data used for this analysis is the "</a:t>
+            </a:r>
+            <a:r>
+              <a:rPr lang="en-US" sz="1200" dirty="0" err="1"/>
+              <a:t>SportsStats</a:t>
+            </a:r>
+            <a:r>
+              <a:rPr lang="en-US" sz="1200" dirty="0"/>
+              <a:t> (Olympics Dataset - 120 years of data)" data set.</a:t>
+            </a:r>
+          </a:p>
+          <a:p>
+            <a:pPr algn="l">
+              <a:lnSpc>
+                <a:spcPct val="95000"/>
+              </a:lnSpc>
+            </a:pPr>
+            <a:r>
+              <a:rPr lang="en-US" sz="1200" dirty="0"/>
+              <a:t>This dataset is made up of two files: athlet_events.csv and noc_regions.csv.</a:t>
+            </a:r>
+          </a:p>
+          <a:p>
+            <a:pPr algn="l">
+              <a:lnSpc>
+                <a:spcPct val="95000"/>
+              </a:lnSpc>
+            </a:pPr>
+            <a:endParaRPr lang="en-US" sz="1200" dirty="0"/>
+          </a:p>
+          <a:p>
+            <a:pPr algn="l">
+              <a:lnSpc>
+                <a:spcPct val="95000"/>
+              </a:lnSpc>
+            </a:pPr>
+            <a:r>
+              <a:rPr lang="en-US" sz="1200" dirty="0"/>
+              <a:t>This data set was chosen because it reveals the Olympic medal award records for different sports categories, the countries that participated, names of the athletes, age, medals, etc.</a:t>
+            </a:r>
+          </a:p>
+          <a:p>
+            <a:pPr algn="l">
+              <a:lnSpc>
+                <a:spcPct val="95000"/>
+              </a:lnSpc>
+            </a:pPr>
+            <a:r>
+              <a:rPr lang="en-US" sz="1200" dirty="0"/>
+              <a:t>Likewise, it can be said that the data is useful for news agencies that report on the different feats in the 120 years of the existence of the Olympic games.</a:t>
+            </a:r>
+          </a:p>
+          <a:p>
+            <a:pPr algn="l">
+              <a:lnSpc>
+                <a:spcPct val="95000"/>
+              </a:lnSpc>
+            </a:pPr>
+            <a:endParaRPr lang="en-US" sz="1200" dirty="0"/>
+          </a:p>
+          <a:p>
+            <a:pPr algn="l">
+              <a:lnSpc>
+                <a:spcPct val="95000"/>
+              </a:lnSpc>
+            </a:pPr>
+            <a:r>
+              <a:rPr lang="en-US" sz="1200" dirty="0"/>
+              <a:t>Also, it can be of great importance for countries aspiring to improve their performance in subsequent Olympic events.</a:t>
+            </a:r>
+          </a:p>
+        </p:txBody>
+      </p:sp>
+      <p:pic>
+        <p:nvPicPr>
+          <p:cNvPr id="14" name="Picture 3">
+            <a:extLst>
+              <a:ext uri="{FF2B5EF4-FFF2-40B4-BE49-F238E27FC236}">
+                <a16:creationId xmlns:a16="http://schemas.microsoft.com/office/drawing/2014/main" id="{F5790F0F-A2D0-4309-9807-1E5BE0E64FC6}"/>
+              </a:ext>
+            </a:extLst>
+          </p:cNvPr>
+          <p:cNvPicPr>
+            <a:picLocks noChangeAspect="1"/>
+          </p:cNvPicPr>
+          <p:nvPr/>
+        </p:nvPicPr>
+        <p:blipFill rotWithShape="1">
+          <a:blip r:embed="rId2"/>
+          <a:srcRect l="25738"/>
+          <a:stretch/>
+        </p:blipFill>
+        <p:spPr>
+          <a:xfrm>
+            <a:off x="5401463" y="10"/>
+            <a:ext cx="6790537" cy="6857990"/>
+          </a:xfrm>
+          <a:prstGeom prst="rect">
+            <a:avLst/>
+          </a:prstGeom>
+        </p:spPr>
+      </p:pic>
+    </p:spTree>
+    <p:extLst>
+      <p:ext uri="{BB962C8B-B14F-4D97-AF65-F5344CB8AC3E}">
+        <p14:creationId xmlns:p14="http://schemas.microsoft.com/office/powerpoint/2010/main" val="884976567"/>
+      </p:ext>
+    </p:extLst>
+  </p:cSld>
+  <p:clrMapOvr>
+    <a:masterClrMapping/>
+  </p:clrMapOvr>
+</p:sld>
+</file>
+
+<file path=ppt/slides/slide3.xml><?xml version="1.0" encoding="utf-8"?>
+<p:sld xmlns:a="http://schemas.openxmlformats.org/drawingml/2006/main" xmlns:r="http://schemas.openxmlformats.org/officeDocument/2006/relationships" xmlns:p="http://schemas.openxmlformats.org/presentationml/2006/main">
+  <p:cSld>
+    <p:bg>
+      <p:bgPr>
+        <a:solidFill>
+          <a:schemeClr val="bg1"/>
+        </a:solidFill>
+        <a:effectLst/>
+      </p:bgPr>
+    </p:bg>
+    <p:spTree>
+      <p:nvGrpSpPr>
+        <p:cNvPr id="1" name=""/>
+        <p:cNvGrpSpPr/>
+        <p:nvPr/>
+      </p:nvGrpSpPr>
+      <p:grpSpPr>
+        <a:xfrm>
+          <a:off x="0" y="0"/>
+          <a:ext cx="0" cy="0"/>
+          <a:chOff x="0" y="0"/>
+          <a:chExt cx="0" cy="0"/>
+        </a:xfrm>
+      </p:grpSpPr>
+      <p:sp>
+        <p:nvSpPr>
+          <p:cNvPr id="19" name="Freeform: Shape 18">
+            <a:extLst>
+              <a:ext uri="{FF2B5EF4-FFF2-40B4-BE49-F238E27FC236}">
+                <a16:creationId xmlns:a16="http://schemas.microsoft.com/office/drawing/2014/main" id="{49306479-8C4D-4E4A-A330-DFC80A8A01BE}"/>
+              </a:ext>
+              <a:ext uri="{C183D7F6-B498-43B3-948B-1728B52AA6E4}">
+                <adec:decorative xmlns:adec="http://schemas.microsoft.com/office/drawing/2017/decorative" val="1"/>
+              </a:ext>
+            </a:extLst>
+          </p:cNvPr>
+          <p:cNvSpPr>
+            <a:spLocks noGrp="1" noRot="1" noChangeAspect="1" noMove="1" noResize="1" noEditPoints="1" noAdjustHandles="1" noChangeArrowheads="1" noChangeShapeType="1" noTextEdit="1"/>
+          </p:cNvSpPr>
+          <p:nvPr>
+            <p:extLst>
+              <p:ext uri="{386F3935-93C4-4BCD-93E2-E3B085C9AB24}">
+                <p16:designElem xmlns:p16="http://schemas.microsoft.com/office/powerpoint/2015/main" val="1"/>
+              </p:ext>
+            </p:extLst>
+          </p:nvPr>
+        </p:nvSpPr>
+        <p:spPr>
+          <a:xfrm>
+            <a:off x="0" y="0"/>
+            <a:ext cx="12192000" cy="6105524"/>
+          </a:xfrm>
+          <a:custGeom>
+            <a:avLst/>
+            <a:gdLst>
+              <a:gd name="connsiteX0" fmla="*/ 0 w 12192000"/>
+              <a:gd name="connsiteY0" fmla="*/ 0 h 6105524"/>
+              <a:gd name="connsiteX1" fmla="*/ 12192000 w 12192000"/>
+              <a:gd name="connsiteY1" fmla="*/ 0 h 6105524"/>
+              <a:gd name="connsiteX2" fmla="*/ 12192000 w 12192000"/>
+              <a:gd name="connsiteY2" fmla="*/ 6105524 h 6105524"/>
+              <a:gd name="connsiteX3" fmla="*/ 11435080 w 12192000"/>
+              <a:gd name="connsiteY3" fmla="*/ 6105524 h 6105524"/>
+              <a:gd name="connsiteX4" fmla="*/ 11435080 w 12192000"/>
+              <a:gd name="connsiteY4" fmla="*/ 771523 h 6105524"/>
+              <a:gd name="connsiteX5" fmla="*/ 767080 w 12192000"/>
+              <a:gd name="connsiteY5" fmla="*/ 771523 h 6105524"/>
+              <a:gd name="connsiteX6" fmla="*/ 767080 w 12192000"/>
+              <a:gd name="connsiteY6" fmla="*/ 6105524 h 6105524"/>
+              <a:gd name="connsiteX7" fmla="*/ 0 w 12192000"/>
+              <a:gd name="connsiteY7" fmla="*/ 6105524 h 6105524"/>
+            </a:gdLst>
+            <a:ahLst/>
+            <a:cxnLst>
+              <a:cxn ang="0">
+                <a:pos x="connsiteX0" y="connsiteY0"/>
+              </a:cxn>
+              <a:cxn ang="0">
+                <a:pos x="connsiteX1" y="connsiteY1"/>
+              </a:cxn>
+              <a:cxn ang="0">
+                <a:pos x="connsiteX2" y="connsiteY2"/>
+              </a:cxn>
+              <a:cxn ang="0">
+                <a:pos x="connsiteX3" y="connsiteY3"/>
+              </a:cxn>
+              <a:cxn ang="0">
+                <a:pos x="connsiteX4" y="connsiteY4"/>
+              </a:cxn>
+              <a:cxn ang="0">
+                <a:pos x="connsiteX5" y="connsiteY5"/>
+              </a:cxn>
+              <a:cxn ang="0">
+                <a:pos x="connsiteX6" y="connsiteY6"/>
+              </a:cxn>
+              <a:cxn ang="0">
+                <a:pos x="connsiteX7" y="connsiteY7"/>
+              </a:cxn>
+            </a:cxnLst>
+            <a:rect l="l" t="t" r="r" b="b"/>
+            <a:pathLst>
+              <a:path w="12192000" h="6105524">
+                <a:moveTo>
+                  <a:pt x="0" y="0"/>
+                </a:moveTo>
+                <a:lnTo>
+                  <a:pt x="12192000" y="0"/>
+                </a:lnTo>
+                <a:lnTo>
+                  <a:pt x="12192000" y="6105524"/>
+                </a:lnTo>
+                <a:lnTo>
+                  <a:pt x="11435080" y="6105524"/>
+                </a:lnTo>
+                <a:lnTo>
+                  <a:pt x="11435080" y="771523"/>
+                </a:lnTo>
+                <a:lnTo>
+                  <a:pt x="767080" y="771523"/>
+                </a:lnTo>
+                <a:lnTo>
+                  <a:pt x="767080" y="6105524"/>
+                </a:lnTo>
+                <a:lnTo>
+                  <a:pt x="0" y="6105524"/>
+                </a:lnTo>
+                <a:close/>
+              </a:path>
+            </a:pathLst>
+          </a:custGeom>
+          <a:gradFill flip="none" rotWithShape="1">
+            <a:gsLst>
+              <a:gs pos="10000">
+                <a:schemeClr val="accent5"/>
+              </a:gs>
+              <a:gs pos="90000">
+                <a:schemeClr val="accent1"/>
+              </a:gs>
+              <a:gs pos="70000">
+                <a:schemeClr val="accent2"/>
+              </a:gs>
+              <a:gs pos="30000">
+                <a:schemeClr val="accent4"/>
+              </a:gs>
+              <a:gs pos="50000">
+                <a:schemeClr val="accent3">
+                  <a:lumMod val="60000"/>
+                  <a:lumOff val="40000"/>
+                </a:schemeClr>
+              </a:gs>
+            </a:gsLst>
+            <a:lin ang="7200000" scaled="0"/>
+            <a:tileRect/>
+          </a:gradFill>
+          <a:ln>
+            <a:noFill/>
+          </a:ln>
+        </p:spPr>
+        <p:style>
+          <a:lnRef idx="2">
+            <a:schemeClr val="accent1">
+              <a:shade val="50000"/>
+            </a:schemeClr>
+          </a:lnRef>
+          <a:fillRef idx="1">
+            <a:schemeClr val="accent1"/>
+          </a:fillRef>
+          <a:effectRef idx="0">
+            <a:schemeClr val="accent1"/>
+          </a:effectRef>
+          <a:fontRef idx="minor">
+            <a:schemeClr val="lt1"/>
+          </a:fontRef>
+        </p:style>
+        <p:txBody>
+          <a:bodyPr wrap="square" rtlCol="0" anchor="ctr">
+            <a:noAutofit/>
+          </a:bodyPr>
+          <a:lstStyle/>
+          <a:p>
+            <a:pPr algn="ctr"/>
+            <a:endParaRPr lang="en-US"/>
+          </a:p>
+        </p:txBody>
+      </p:sp>
+      <p:sp useBgFill="1">
+        <p:nvSpPr>
+          <p:cNvPr id="21" name="Rectangle 20">
+            <a:extLst>
+              <a:ext uri="{FF2B5EF4-FFF2-40B4-BE49-F238E27FC236}">
+                <a16:creationId xmlns:a16="http://schemas.microsoft.com/office/drawing/2014/main" id="{84136905-015B-4510-B514-027CBA846BD6}"/>
+              </a:ext>
+              <a:ext uri="{C183D7F6-B498-43B3-948B-1728B52AA6E4}">
+                <adec:decorative xmlns:adec="http://schemas.microsoft.com/office/drawing/2017/decorative" val="1"/>
+              </a:ext>
+            </a:extLst>
+          </p:cNvPr>
+          <p:cNvSpPr>
+            <a:spLocks noGrp="1" noRot="1" noChangeAspect="1" noMove="1" noResize="1" noEditPoints="1" noAdjustHandles="1" noChangeArrowheads="1" noChangeShapeType="1" noTextEdit="1"/>
+          </p:cNvSpPr>
+          <p:nvPr>
+            <p:extLst>
+              <p:ext uri="{386F3935-93C4-4BCD-93E2-E3B085C9AB24}">
+                <p16:designElem xmlns:p16="http://schemas.microsoft.com/office/powerpoint/2015/main" val="1"/>
+              </p:ext>
+            </p:extLst>
+          </p:nvPr>
+        </p:nvSpPr>
+        <p:spPr>
+          <a:xfrm>
+            <a:off x="0" y="0"/>
+            <a:ext cx="12192000" cy="6858000"/>
+          </a:xfrm>
+          <a:prstGeom prst="rect">
+            <a:avLst/>
+          </a:prstGeom>
+          <a:ln>
+            <a:noFill/>
+          </a:ln>
+        </p:spPr>
+        <p:style>
+          <a:lnRef idx="2">
+            <a:schemeClr val="accent1">
+              <a:shade val="50000"/>
+            </a:schemeClr>
+          </a:lnRef>
+          <a:fillRef idx="1">
+            <a:schemeClr val="accent1"/>
+          </a:fillRef>
+          <a:effectRef idx="0">
+            <a:schemeClr val="accent1"/>
+          </a:effectRef>
+          <a:fontRef idx="minor">
+            <a:schemeClr val="lt1"/>
+          </a:fontRef>
+        </p:style>
+        <p:txBody>
+          <a:bodyPr rtlCol="0" anchor="ctr"/>
+          <a:lstStyle/>
+          <a:p>
+            <a:pPr algn="ctr"/>
+            <a:endParaRPr lang="en-US"/>
+          </a:p>
+        </p:txBody>
+      </p:sp>
+      <p:sp>
+        <p:nvSpPr>
+          <p:cNvPr id="2" name="Título 1">
+            <a:extLst>
+              <a:ext uri="{FF2B5EF4-FFF2-40B4-BE49-F238E27FC236}">
+                <a16:creationId xmlns:a16="http://schemas.microsoft.com/office/drawing/2014/main" id="{92B69FF4-5F8D-4B10-BAEC-4C2B411385B5}"/>
+              </a:ext>
+            </a:extLst>
+          </p:cNvPr>
+          <p:cNvSpPr>
+            <a:spLocks noGrp="1"/>
+          </p:cNvSpPr>
+          <p:nvPr>
+            <p:ph type="ctrTitle"/>
+          </p:nvPr>
+        </p:nvSpPr>
+        <p:spPr>
+          <a:xfrm>
+            <a:off x="760476" y="1023994"/>
+            <a:ext cx="3880511" cy="950579"/>
+          </a:xfrm>
+        </p:spPr>
+        <p:txBody>
+          <a:bodyPr vert="horz" lIns="91440" tIns="45720" rIns="91440" bIns="45720" rtlCol="0" anchor="t">
+            <a:normAutofit/>
+          </a:bodyPr>
+          <a:lstStyle/>
+          <a:p>
+            <a:pPr algn="l"/>
+            <a:r>
+              <a:rPr lang="en-US" sz="4200" kern="1200" spc="-50" baseline="0" dirty="0">
+                <a:solidFill>
+                  <a:schemeClr val="tx1"/>
+                </a:solidFill>
+                <a:latin typeface="+mj-lt"/>
+                <a:ea typeface="+mj-ea"/>
+                <a:cs typeface="+mj-cs"/>
+              </a:rPr>
+              <a:t>Import Data</a:t>
+            </a:r>
+          </a:p>
+        </p:txBody>
+      </p:sp>
+      <p:sp>
+        <p:nvSpPr>
+          <p:cNvPr id="3" name="Subtítulo 2">
+            <a:extLst>
+              <a:ext uri="{FF2B5EF4-FFF2-40B4-BE49-F238E27FC236}">
+                <a16:creationId xmlns:a16="http://schemas.microsoft.com/office/drawing/2014/main" id="{13784A56-64CD-4842-BFFE-CAB25B8F73AC}"/>
+              </a:ext>
+            </a:extLst>
+          </p:cNvPr>
+          <p:cNvSpPr>
+            <a:spLocks noGrp="1"/>
+          </p:cNvSpPr>
+          <p:nvPr>
+            <p:ph type="subTitle" idx="1"/>
+          </p:nvPr>
+        </p:nvSpPr>
+        <p:spPr>
+          <a:xfrm>
+            <a:off x="762000" y="2566640"/>
+            <a:ext cx="4822874" cy="2151134"/>
+          </a:xfrm>
+        </p:spPr>
+        <p:txBody>
+          <a:bodyPr vert="horz" lIns="91440" tIns="45720" rIns="91440" bIns="45720" rtlCol="0">
+            <a:normAutofit/>
+          </a:bodyPr>
+          <a:lstStyle/>
+          <a:p>
+            <a:pPr algn="l"/>
+            <a:r>
+              <a:rPr lang="es-PE" sz="2000" b="1" i="0" dirty="0" err="1">
+                <a:solidFill>
+                  <a:srgbClr val="2D2D2D"/>
+                </a:solidFill>
+                <a:effectLst/>
+                <a:latin typeface="Open Sans" panose="020B0606030504020204" pitchFamily="34" charset="0"/>
+              </a:rPr>
+              <a:t>Getting</a:t>
+            </a:r>
+            <a:r>
+              <a:rPr lang="es-PE" sz="2000" b="1" i="0" dirty="0">
+                <a:solidFill>
+                  <a:srgbClr val="2D2D2D"/>
+                </a:solidFill>
+                <a:effectLst/>
+                <a:latin typeface="Open Sans" panose="020B0606030504020204" pitchFamily="34" charset="0"/>
+              </a:rPr>
+              <a:t> and </a:t>
+            </a:r>
+            <a:r>
+              <a:rPr lang="es-PE" sz="2000" b="1" i="0" dirty="0" err="1">
+                <a:solidFill>
+                  <a:srgbClr val="2D2D2D"/>
+                </a:solidFill>
+                <a:effectLst/>
+                <a:latin typeface="Open Sans" panose="020B0606030504020204" pitchFamily="34" charset="0"/>
+              </a:rPr>
+              <a:t>Cleaning</a:t>
+            </a:r>
+            <a:r>
+              <a:rPr lang="es-PE" sz="2000" b="1" i="0" dirty="0">
+                <a:solidFill>
+                  <a:srgbClr val="2D2D2D"/>
+                </a:solidFill>
+                <a:effectLst/>
+                <a:latin typeface="Open Sans" panose="020B0606030504020204" pitchFamily="34" charset="0"/>
+              </a:rPr>
+              <a:t> Data</a:t>
+            </a:r>
+          </a:p>
+          <a:p>
+            <a:pPr algn="l"/>
+            <a:r>
+              <a:rPr lang="en-US" sz="1600" i="0" dirty="0">
+                <a:solidFill>
+                  <a:srgbClr val="2D2D2D"/>
+                </a:solidFill>
+                <a:effectLst/>
+                <a:latin typeface="Open Sans" panose="020B0606030504020204" pitchFamily="34" charset="0"/>
+              </a:rPr>
+              <a:t>Data analysis is done using python. The necessary resources are uploaded to google </a:t>
+            </a:r>
+            <a:r>
+              <a:rPr lang="en-US" sz="1600" i="0" dirty="0" err="1">
+                <a:solidFill>
+                  <a:srgbClr val="2D2D2D"/>
+                </a:solidFill>
+                <a:effectLst/>
+                <a:latin typeface="Open Sans" panose="020B0606030504020204" pitchFamily="34" charset="0"/>
+              </a:rPr>
+              <a:t>colab</a:t>
+            </a:r>
+            <a:r>
+              <a:rPr lang="en-US" sz="1600" i="0" dirty="0">
+                <a:solidFill>
+                  <a:srgbClr val="2D2D2D"/>
+                </a:solidFill>
+                <a:effectLst/>
+                <a:latin typeface="Open Sans" panose="020B0606030504020204" pitchFamily="34" charset="0"/>
+              </a:rPr>
+              <a:t>.</a:t>
+            </a:r>
+          </a:p>
+          <a:p>
+            <a:pPr algn="l"/>
+            <a:r>
+              <a:rPr lang="en-US" sz="1600" i="0" dirty="0">
+                <a:solidFill>
+                  <a:srgbClr val="2D2D2D"/>
+                </a:solidFill>
+                <a:effectLst/>
+                <a:latin typeface="Open Sans" panose="020B0606030504020204" pitchFamily="34" charset="0"/>
+              </a:rPr>
+              <a:t>Here are some screenshots of how the data was imported into a </a:t>
+            </a:r>
+            <a:r>
+              <a:rPr lang="en-US" sz="1600" i="0" dirty="0" err="1">
+                <a:solidFill>
+                  <a:srgbClr val="2D2D2D"/>
+                </a:solidFill>
+                <a:effectLst/>
+                <a:latin typeface="Open Sans" panose="020B0606030504020204" pitchFamily="34" charset="0"/>
+              </a:rPr>
+              <a:t>Sqlite</a:t>
+            </a:r>
+            <a:r>
+              <a:rPr lang="en-US" sz="1600" i="0" dirty="0">
+                <a:solidFill>
+                  <a:srgbClr val="2D2D2D"/>
+                </a:solidFill>
+                <a:effectLst/>
+                <a:latin typeface="Open Sans" panose="020B0606030504020204" pitchFamily="34" charset="0"/>
+              </a:rPr>
+              <a:t> database</a:t>
+            </a:r>
+            <a:endParaRPr lang="es-PE" sz="1600" i="0" dirty="0">
+              <a:solidFill>
+                <a:srgbClr val="2D2D2D"/>
+              </a:solidFill>
+              <a:effectLst/>
+              <a:latin typeface="Open Sans" panose="020B0606030504020204" pitchFamily="34" charset="0"/>
+            </a:endParaRPr>
+          </a:p>
+        </p:txBody>
+      </p:sp>
+      <p:pic>
+        <p:nvPicPr>
+          <p:cNvPr id="14" name="Picture 3">
+            <a:extLst>
+              <a:ext uri="{FF2B5EF4-FFF2-40B4-BE49-F238E27FC236}">
+                <a16:creationId xmlns:a16="http://schemas.microsoft.com/office/drawing/2014/main" id="{F5790F0F-A2D0-4309-9807-1E5BE0E64FC6}"/>
+              </a:ext>
+            </a:extLst>
+          </p:cNvPr>
+          <p:cNvPicPr>
+            <a:picLocks noChangeAspect="1"/>
+          </p:cNvPicPr>
+          <p:nvPr/>
+        </p:nvPicPr>
+        <p:blipFill rotWithShape="1">
+          <a:blip r:embed="rId2"/>
+          <a:srcRect l="25738"/>
+          <a:stretch/>
+        </p:blipFill>
+        <p:spPr>
+          <a:xfrm>
+            <a:off x="5401463" y="10"/>
+            <a:ext cx="6790537" cy="6857990"/>
+          </a:xfrm>
+          <a:prstGeom prst="rect">
+            <a:avLst/>
+          </a:prstGeom>
+        </p:spPr>
+      </p:pic>
+    </p:spTree>
+    <p:extLst>
+      <p:ext uri="{BB962C8B-B14F-4D97-AF65-F5344CB8AC3E}">
+        <p14:creationId xmlns:p14="http://schemas.microsoft.com/office/powerpoint/2010/main" val="3297361357"/>
+      </p:ext>
+    </p:extLst>
+  </p:cSld>
+  <p:clrMapOvr>
+    <a:masterClrMapping/>
+  </p:clrMapOvr>
+</p:sld>
+</file>
+
+<file path=ppt/slides/slide4.xml><?xml version="1.0" encoding="utf-8"?>
+<p:sld xmlns:a="http://schemas.openxmlformats.org/drawingml/2006/main" xmlns:r="http://schemas.openxmlformats.org/officeDocument/2006/relationships" xmlns:p="http://schemas.openxmlformats.org/presentationml/2006/main">
+  <p:cSld>
+    <p:bg>
+      <p:bgPr>
+        <a:solidFill>
+          <a:schemeClr val="bg1"/>
+        </a:solidFill>
+        <a:effectLst/>
+      </p:bgPr>
+    </p:bg>
+    <p:spTree>
+      <p:nvGrpSpPr>
+        <p:cNvPr id="1" name=""/>
+        <p:cNvGrpSpPr/>
+        <p:nvPr/>
+      </p:nvGrpSpPr>
+      <p:grpSpPr>
+        <a:xfrm>
+          <a:off x="0" y="0"/>
+          <a:ext cx="0" cy="0"/>
+          <a:chOff x="0" y="0"/>
+          <a:chExt cx="0" cy="0"/>
+        </a:xfrm>
+      </p:grpSpPr>
+      <p:sp useBgFill="1">
+        <p:nvSpPr>
+          <p:cNvPr id="26" name="Rectangle 25">
+            <a:extLst>
+              <a:ext uri="{FF2B5EF4-FFF2-40B4-BE49-F238E27FC236}">
+                <a16:creationId xmlns:a16="http://schemas.microsoft.com/office/drawing/2014/main" id="{220E33D0-A190-4F8A-9DB6-C531C95CA02D}"/>
+              </a:ext>
+              <a:ext uri="{C183D7F6-B498-43B3-948B-1728B52AA6E4}">
+                <adec:decorative xmlns:adec="http://schemas.microsoft.com/office/drawing/2017/decorative" val="1"/>
+              </a:ext>
+            </a:extLst>
+          </p:cNvPr>
+          <p:cNvSpPr>
+            <a:spLocks noGrp="1" noRot="1" noChangeAspect="1" noMove="1" noResize="1" noEditPoints="1" noAdjustHandles="1" noChangeArrowheads="1" noChangeShapeType="1" noTextEdit="1"/>
+          </p:cNvSpPr>
+          <p:nvPr>
+            <p:extLst>
+              <p:ext uri="{386F3935-93C4-4BCD-93E2-E3B085C9AB24}">
+                <p16:designElem xmlns:p16="http://schemas.microsoft.com/office/powerpoint/2015/main" val="1"/>
+              </p:ext>
+            </p:extLst>
+          </p:nvPr>
+        </p:nvSpPr>
+        <p:spPr>
+          <a:xfrm>
+            <a:off x="0" y="0"/>
+            <a:ext cx="12192000" cy="6858000"/>
+          </a:xfrm>
+          <a:prstGeom prst="rect">
+            <a:avLst/>
+          </a:prstGeom>
+          <a:ln>
+            <a:noFill/>
+          </a:ln>
+        </p:spPr>
+        <p:style>
+          <a:lnRef idx="2">
+            <a:schemeClr val="accent1">
+              <a:shade val="50000"/>
+            </a:schemeClr>
+          </a:lnRef>
+          <a:fillRef idx="1">
+            <a:schemeClr val="accent1"/>
+          </a:fillRef>
+          <a:effectRef idx="0">
+            <a:schemeClr val="accent1"/>
+          </a:effectRef>
+          <a:fontRef idx="minor">
+            <a:schemeClr val="lt1"/>
+          </a:fontRef>
+        </p:style>
+        <p:txBody>
+          <a:bodyPr rtlCol="0" anchor="ctr"/>
+          <a:lstStyle/>
+          <a:p>
+            <a:pPr algn="ctr"/>
+            <a:endParaRPr lang="en-US"/>
+          </a:p>
+        </p:txBody>
+      </p:sp>
+      <p:sp>
+        <p:nvSpPr>
+          <p:cNvPr id="2" name="Título 1">
+            <a:extLst>
+              <a:ext uri="{FF2B5EF4-FFF2-40B4-BE49-F238E27FC236}">
+                <a16:creationId xmlns:a16="http://schemas.microsoft.com/office/drawing/2014/main" id="{92B69FF4-5F8D-4B10-BAEC-4C2B411385B5}"/>
+              </a:ext>
+            </a:extLst>
+          </p:cNvPr>
+          <p:cNvSpPr>
+            <a:spLocks noGrp="1"/>
+          </p:cNvSpPr>
+          <p:nvPr>
+            <p:ph type="ctrTitle"/>
+          </p:nvPr>
+        </p:nvSpPr>
+        <p:spPr>
+          <a:xfrm>
+            <a:off x="762000" y="5347941"/>
+            <a:ext cx="10668000" cy="1042660"/>
+          </a:xfrm>
+        </p:spPr>
+        <p:txBody>
+          <a:bodyPr vert="horz" lIns="91440" tIns="45720" rIns="91440" bIns="45720" rtlCol="0">
+            <a:normAutofit/>
+          </a:bodyPr>
+          <a:lstStyle/>
+          <a:p>
+            <a:r>
+              <a:rPr lang="en-US" kern="1200" spc="-50" baseline="0" dirty="0">
+                <a:latin typeface="+mj-lt"/>
+                <a:ea typeface="+mj-ea"/>
+                <a:cs typeface="+mj-cs"/>
+              </a:rPr>
+              <a:t>Import Data</a:t>
+            </a:r>
+          </a:p>
+        </p:txBody>
+      </p:sp>
+      <p:pic>
+        <p:nvPicPr>
+          <p:cNvPr id="7" name="Imagen 6">
+            <a:extLst>
+              <a:ext uri="{FF2B5EF4-FFF2-40B4-BE49-F238E27FC236}">
+                <a16:creationId xmlns:a16="http://schemas.microsoft.com/office/drawing/2014/main" id="{2C575EF6-545F-4AF9-967C-D7F479175D5D}"/>
+              </a:ext>
+            </a:extLst>
+          </p:cNvPr>
+          <p:cNvPicPr>
+            <a:picLocks noChangeAspect="1"/>
+          </p:cNvPicPr>
+          <p:nvPr/>
+        </p:nvPicPr>
+        <p:blipFill>
+          <a:blip r:embed="rId2"/>
+          <a:stretch>
+            <a:fillRect/>
+          </a:stretch>
+        </p:blipFill>
+        <p:spPr>
+          <a:xfrm>
+            <a:off x="1378634" y="752894"/>
+            <a:ext cx="9775240" cy="4325543"/>
+          </a:xfrm>
+          <a:prstGeom prst="rect">
+            <a:avLst/>
+          </a:prstGeom>
+        </p:spPr>
+      </p:pic>
+    </p:spTree>
+    <p:extLst>
+      <p:ext uri="{BB962C8B-B14F-4D97-AF65-F5344CB8AC3E}">
+        <p14:creationId xmlns:p14="http://schemas.microsoft.com/office/powerpoint/2010/main" val="3373364923"/>
+      </p:ext>
+    </p:extLst>
+  </p:cSld>
+  <p:clrMapOvr>
+    <a:masterClrMapping/>
+  </p:clrMapOvr>
+</p:sld>
+</file>
+
+<file path=ppt/slides/slide5.xml><?xml version="1.0" encoding="utf-8"?>
+<p:sld xmlns:a="http://schemas.openxmlformats.org/drawingml/2006/main" xmlns:r="http://schemas.openxmlformats.org/officeDocument/2006/relationships" xmlns:p="http://schemas.openxmlformats.org/presentationml/2006/main">
+  <p:cSld>
+    <p:bg>
+      <p:bgPr>
+        <a:solidFill>
+          <a:schemeClr val="bg1"/>
+        </a:solidFill>
+        <a:effectLst/>
+      </p:bgPr>
+    </p:bg>
+    <p:spTree>
+      <p:nvGrpSpPr>
+        <p:cNvPr id="1" name=""/>
+        <p:cNvGrpSpPr/>
+        <p:nvPr/>
+      </p:nvGrpSpPr>
+      <p:grpSpPr>
+        <a:xfrm>
+          <a:off x="0" y="0"/>
+          <a:ext cx="0" cy="0"/>
+          <a:chOff x="0" y="0"/>
+          <a:chExt cx="0" cy="0"/>
+        </a:xfrm>
+      </p:grpSpPr>
+      <p:sp useBgFill="1">
+        <p:nvSpPr>
+          <p:cNvPr id="26" name="Rectangle 25">
+            <a:extLst>
+              <a:ext uri="{FF2B5EF4-FFF2-40B4-BE49-F238E27FC236}">
+                <a16:creationId xmlns:a16="http://schemas.microsoft.com/office/drawing/2014/main" id="{220E33D0-A190-4F8A-9DB6-C531C95CA02D}"/>
+              </a:ext>
+              <a:ext uri="{C183D7F6-B498-43B3-948B-1728B52AA6E4}">
+                <adec:decorative xmlns:adec="http://schemas.microsoft.com/office/drawing/2017/decorative" val="1"/>
+              </a:ext>
+            </a:extLst>
+          </p:cNvPr>
+          <p:cNvSpPr>
+            <a:spLocks noGrp="1" noRot="1" noChangeAspect="1" noMove="1" noResize="1" noEditPoints="1" noAdjustHandles="1" noChangeArrowheads="1" noChangeShapeType="1" noTextEdit="1"/>
+          </p:cNvSpPr>
+          <p:nvPr>
+            <p:extLst>
+              <p:ext uri="{386F3935-93C4-4BCD-93E2-E3B085C9AB24}">
+                <p16:designElem xmlns:p16="http://schemas.microsoft.com/office/powerpoint/2015/main" val="1"/>
+              </p:ext>
+            </p:extLst>
+          </p:nvPr>
+        </p:nvSpPr>
+        <p:spPr>
+          <a:xfrm>
+            <a:off x="0" y="0"/>
+            <a:ext cx="12192000" cy="6858000"/>
+          </a:xfrm>
+          <a:prstGeom prst="rect">
+            <a:avLst/>
+          </a:prstGeom>
+          <a:ln>
+            <a:noFill/>
+          </a:ln>
+        </p:spPr>
+        <p:style>
+          <a:lnRef idx="2">
+            <a:schemeClr val="accent1">
+              <a:shade val="50000"/>
+            </a:schemeClr>
+          </a:lnRef>
+          <a:fillRef idx="1">
+            <a:schemeClr val="accent1"/>
+          </a:fillRef>
+          <a:effectRef idx="0">
+            <a:schemeClr val="accent1"/>
+          </a:effectRef>
+          <a:fontRef idx="minor">
+            <a:schemeClr val="lt1"/>
+          </a:fontRef>
+        </p:style>
+        <p:txBody>
+          <a:bodyPr rtlCol="0" anchor="ctr"/>
+          <a:lstStyle/>
+          <a:p>
+            <a:pPr algn="ctr"/>
+            <a:endParaRPr lang="en-US"/>
+          </a:p>
+        </p:txBody>
+      </p:sp>
+      <p:sp>
+        <p:nvSpPr>
+          <p:cNvPr id="2" name="Título 1">
+            <a:extLst>
+              <a:ext uri="{FF2B5EF4-FFF2-40B4-BE49-F238E27FC236}">
+                <a16:creationId xmlns:a16="http://schemas.microsoft.com/office/drawing/2014/main" id="{92B69FF4-5F8D-4B10-BAEC-4C2B411385B5}"/>
+              </a:ext>
+            </a:extLst>
+          </p:cNvPr>
+          <p:cNvSpPr>
+            <a:spLocks noGrp="1"/>
+          </p:cNvSpPr>
+          <p:nvPr>
+            <p:ph type="ctrTitle"/>
+          </p:nvPr>
+        </p:nvSpPr>
+        <p:spPr>
+          <a:xfrm>
+            <a:off x="761999" y="4714895"/>
+            <a:ext cx="10668000" cy="1042660"/>
+          </a:xfrm>
+        </p:spPr>
+        <p:txBody>
+          <a:bodyPr vert="horz" lIns="91440" tIns="45720" rIns="91440" bIns="45720" rtlCol="0">
+            <a:normAutofit/>
+          </a:bodyPr>
+          <a:lstStyle/>
+          <a:p>
+            <a:r>
+              <a:rPr lang="en-US" kern="1200" spc="-50" baseline="0" dirty="0">
+                <a:latin typeface="+mj-lt"/>
+                <a:ea typeface="+mj-ea"/>
+                <a:cs typeface="+mj-cs"/>
+              </a:rPr>
+              <a:t>Create database</a:t>
+            </a:r>
+          </a:p>
+        </p:txBody>
+      </p:sp>
+      <p:pic>
+        <p:nvPicPr>
+          <p:cNvPr id="4" name="Imagen 3">
+            <a:extLst>
+              <a:ext uri="{FF2B5EF4-FFF2-40B4-BE49-F238E27FC236}">
+                <a16:creationId xmlns:a16="http://schemas.microsoft.com/office/drawing/2014/main" id="{67360484-68E4-451C-A972-22630DAB75BF}"/>
+              </a:ext>
+            </a:extLst>
+          </p:cNvPr>
+          <p:cNvPicPr>
+            <a:picLocks noChangeAspect="1"/>
+          </p:cNvPicPr>
+          <p:nvPr/>
+        </p:nvPicPr>
+        <p:blipFill>
+          <a:blip r:embed="rId2"/>
+          <a:stretch>
+            <a:fillRect/>
+          </a:stretch>
+        </p:blipFill>
+        <p:spPr>
+          <a:xfrm>
+            <a:off x="388069" y="1243824"/>
+            <a:ext cx="11415861" cy="2860293"/>
+          </a:xfrm>
+          <a:prstGeom prst="rect">
+            <a:avLst/>
+          </a:prstGeom>
+        </p:spPr>
+      </p:pic>
+    </p:spTree>
+    <p:extLst>
+      <p:ext uri="{BB962C8B-B14F-4D97-AF65-F5344CB8AC3E}">
+        <p14:creationId xmlns:p14="http://schemas.microsoft.com/office/powerpoint/2010/main" val="779209758"/>
+      </p:ext>
+    </p:extLst>
+  </p:cSld>
+  <p:clrMapOvr>
+    <a:masterClrMapping/>
+  </p:clrMapOvr>
+</p:sld>
+</file>
+
+<file path=ppt/slides/slide6.xml><?xml version="1.0" encoding="utf-8"?>
+<p:sld xmlns:a="http://schemas.openxmlformats.org/drawingml/2006/main" xmlns:r="http://schemas.openxmlformats.org/officeDocument/2006/relationships" xmlns:p="http://schemas.openxmlformats.org/presentationml/2006/main">
+  <p:cSld>
+    <p:bg>
+      <p:bgPr>
+        <a:solidFill>
+          <a:schemeClr val="bg1"/>
+        </a:solidFill>
+        <a:effectLst/>
+      </p:bgPr>
+    </p:bg>
+    <p:spTree>
+      <p:nvGrpSpPr>
+        <p:cNvPr id="1" name=""/>
+        <p:cNvGrpSpPr/>
+        <p:nvPr/>
+      </p:nvGrpSpPr>
+      <p:grpSpPr>
+        <a:xfrm>
+          <a:off x="0" y="0"/>
+          <a:ext cx="0" cy="0"/>
+          <a:chOff x="0" y="0"/>
+          <a:chExt cx="0" cy="0"/>
+        </a:xfrm>
+      </p:grpSpPr>
+      <p:sp useBgFill="1">
+        <p:nvSpPr>
+          <p:cNvPr id="31" name="Rectangle 30">
+            <a:extLst>
+              <a:ext uri="{FF2B5EF4-FFF2-40B4-BE49-F238E27FC236}">
+                <a16:creationId xmlns:a16="http://schemas.microsoft.com/office/drawing/2014/main" id="{220E33D0-A190-4F8A-9DB6-C531C95CA02D}"/>
+              </a:ext>
+              <a:ext uri="{C183D7F6-B498-43B3-948B-1728B52AA6E4}">
+                <adec:decorative xmlns:adec="http://schemas.microsoft.com/office/drawing/2017/decorative" val="1"/>
+              </a:ext>
+            </a:extLst>
+          </p:cNvPr>
+          <p:cNvSpPr>
+            <a:spLocks noGrp="1" noRot="1" noChangeAspect="1" noMove="1" noResize="1" noEditPoints="1" noAdjustHandles="1" noChangeArrowheads="1" noChangeShapeType="1" noTextEdit="1"/>
+          </p:cNvSpPr>
+          <p:nvPr>
+            <p:extLst>
+              <p:ext uri="{386F3935-93C4-4BCD-93E2-E3B085C9AB24}">
+                <p16:designElem xmlns:p16="http://schemas.microsoft.com/office/powerpoint/2015/main" val="1"/>
+              </p:ext>
+            </p:extLst>
+          </p:nvPr>
+        </p:nvSpPr>
+        <p:spPr>
+          <a:xfrm>
+            <a:off x="0" y="0"/>
+            <a:ext cx="12192000" cy="6858000"/>
+          </a:xfrm>
+          <a:prstGeom prst="rect">
+            <a:avLst/>
+          </a:prstGeom>
+          <a:ln>
+            <a:noFill/>
+          </a:ln>
+        </p:spPr>
+        <p:style>
+          <a:lnRef idx="2">
+            <a:schemeClr val="accent1">
+              <a:shade val="50000"/>
+            </a:schemeClr>
+          </a:lnRef>
+          <a:fillRef idx="1">
+            <a:schemeClr val="accent1"/>
+          </a:fillRef>
+          <a:effectRef idx="0">
+            <a:schemeClr val="accent1"/>
+          </a:effectRef>
+          <a:fontRef idx="minor">
+            <a:schemeClr val="lt1"/>
+          </a:fontRef>
+        </p:style>
+        <p:txBody>
+          <a:bodyPr rtlCol="0" anchor="ctr"/>
+          <a:lstStyle/>
+          <a:p>
+            <a:pPr algn="ctr"/>
+            <a:endParaRPr lang="en-US"/>
+          </a:p>
+        </p:txBody>
+      </p:sp>
+      <p:sp>
+        <p:nvSpPr>
+          <p:cNvPr id="2" name="Título 1">
+            <a:extLst>
+              <a:ext uri="{FF2B5EF4-FFF2-40B4-BE49-F238E27FC236}">
+                <a16:creationId xmlns:a16="http://schemas.microsoft.com/office/drawing/2014/main" id="{92B69FF4-5F8D-4B10-BAEC-4C2B411385B5}"/>
+              </a:ext>
+            </a:extLst>
+          </p:cNvPr>
+          <p:cNvSpPr>
+            <a:spLocks noGrp="1"/>
+          </p:cNvSpPr>
+          <p:nvPr>
+            <p:ph type="ctrTitle"/>
+          </p:nvPr>
+        </p:nvSpPr>
+        <p:spPr>
+          <a:xfrm>
+            <a:off x="758951" y="4714895"/>
+            <a:ext cx="10668000" cy="1042660"/>
+          </a:xfrm>
+        </p:spPr>
+        <p:txBody>
+          <a:bodyPr vert="horz" lIns="91440" tIns="45720" rIns="91440" bIns="45720" rtlCol="0">
+            <a:normAutofit/>
+          </a:bodyPr>
+          <a:lstStyle/>
+          <a:p>
+            <a:r>
+              <a:rPr lang="en-US" kern="1200" spc="-50" baseline="0" dirty="0">
+                <a:latin typeface="+mj-lt"/>
+                <a:ea typeface="+mj-ea"/>
+                <a:cs typeface="+mj-cs"/>
+              </a:rPr>
+              <a:t>Create tables</a:t>
+            </a:r>
+          </a:p>
+        </p:txBody>
+      </p:sp>
+      <p:pic>
+        <p:nvPicPr>
+          <p:cNvPr id="7" name="Imagen 6">
+            <a:extLst>
+              <a:ext uri="{FF2B5EF4-FFF2-40B4-BE49-F238E27FC236}">
+                <a16:creationId xmlns:a16="http://schemas.microsoft.com/office/drawing/2014/main" id="{8F2F6CB4-F41C-4CC2-B392-1FE461BE0B69}"/>
+              </a:ext>
+            </a:extLst>
+          </p:cNvPr>
+          <p:cNvPicPr>
+            <a:picLocks noChangeAspect="1"/>
+          </p:cNvPicPr>
+          <p:nvPr/>
+        </p:nvPicPr>
+        <p:blipFill>
+          <a:blip r:embed="rId2"/>
+          <a:stretch>
+            <a:fillRect/>
+          </a:stretch>
+        </p:blipFill>
+        <p:spPr>
+          <a:xfrm>
+            <a:off x="758952" y="1399455"/>
+            <a:ext cx="5166731" cy="2166693"/>
+          </a:xfrm>
+          <a:prstGeom prst="rect">
+            <a:avLst/>
+          </a:prstGeom>
+        </p:spPr>
+      </p:pic>
+      <p:pic>
+        <p:nvPicPr>
+          <p:cNvPr id="5" name="Imagen 4">
+            <a:extLst>
+              <a:ext uri="{FF2B5EF4-FFF2-40B4-BE49-F238E27FC236}">
+                <a16:creationId xmlns:a16="http://schemas.microsoft.com/office/drawing/2014/main" id="{5D3680E5-F685-4402-91F2-302D92B92EE0}"/>
+              </a:ext>
+            </a:extLst>
+          </p:cNvPr>
+          <p:cNvPicPr>
+            <a:picLocks noChangeAspect="1"/>
+          </p:cNvPicPr>
+          <p:nvPr/>
+        </p:nvPicPr>
+        <p:blipFill rotWithShape="1">
+          <a:blip r:embed="rId3"/>
+          <a:srcRect r="52346"/>
+          <a:stretch/>
+        </p:blipFill>
+        <p:spPr>
+          <a:xfrm>
+            <a:off x="6646169" y="748781"/>
+            <a:ext cx="4391481" cy="3432718"/>
+          </a:xfrm>
+          <a:prstGeom prst="rect">
+            <a:avLst/>
+          </a:prstGeom>
+        </p:spPr>
+      </p:pic>
+    </p:spTree>
+    <p:extLst>
+      <p:ext uri="{BB962C8B-B14F-4D97-AF65-F5344CB8AC3E}">
+        <p14:creationId xmlns:p14="http://schemas.microsoft.com/office/powerpoint/2010/main" val="2655963614"/>
+      </p:ext>
+    </p:extLst>
+  </p:cSld>
+  <p:clrMapOvr>
+    <a:masterClrMapping/>
+  </p:clrMapOvr>
+</p:sld>
+</file>
+
+<file path=ppt/slides/slide7.xml><?xml version="1.0" encoding="utf-8"?>
+<p:sld xmlns:a="http://schemas.openxmlformats.org/drawingml/2006/main" xmlns:r="http://schemas.openxmlformats.org/officeDocument/2006/relationships" xmlns:p="http://schemas.openxmlformats.org/presentationml/2006/main">
+  <p:cSld>
+    <p:bg>
+      <p:bgPr>
+        <a:solidFill>
+          <a:schemeClr val="bg1"/>
+        </a:solidFill>
+        <a:effectLst/>
+      </p:bgPr>
+    </p:bg>
+    <p:spTree>
+      <p:nvGrpSpPr>
+        <p:cNvPr id="1" name=""/>
+        <p:cNvGrpSpPr/>
+        <p:nvPr/>
+      </p:nvGrpSpPr>
+      <p:grpSpPr>
+        <a:xfrm>
+          <a:off x="0" y="0"/>
+          <a:ext cx="0" cy="0"/>
+          <a:chOff x="0" y="0"/>
+          <a:chExt cx="0" cy="0"/>
+        </a:xfrm>
+      </p:grpSpPr>
+      <p:sp useBgFill="1">
+        <p:nvSpPr>
+          <p:cNvPr id="26" name="Rectangle 25">
+            <a:extLst>
+              <a:ext uri="{FF2B5EF4-FFF2-40B4-BE49-F238E27FC236}">
+                <a16:creationId xmlns:a16="http://schemas.microsoft.com/office/drawing/2014/main" id="{220E33D0-A190-4F8A-9DB6-C531C95CA02D}"/>
+              </a:ext>
+              <a:ext uri="{C183D7F6-B498-43B3-948B-1728B52AA6E4}">
+                <adec:decorative xmlns:adec="http://schemas.microsoft.com/office/drawing/2017/decorative" val="1"/>
+              </a:ext>
+            </a:extLst>
+          </p:cNvPr>
+          <p:cNvSpPr>
+            <a:spLocks noGrp="1" noRot="1" noChangeAspect="1" noMove="1" noResize="1" noEditPoints="1" noAdjustHandles="1" noChangeArrowheads="1" noChangeShapeType="1" noTextEdit="1"/>
+          </p:cNvSpPr>
+          <p:nvPr>
+            <p:extLst>
+              <p:ext uri="{386F3935-93C4-4BCD-93E2-E3B085C9AB24}">
+                <p16:designElem xmlns:p16="http://schemas.microsoft.com/office/powerpoint/2015/main" val="1"/>
+              </p:ext>
+            </p:extLst>
+          </p:nvPr>
+        </p:nvSpPr>
+        <p:spPr>
+          <a:xfrm>
+            <a:off x="0" y="0"/>
+            <a:ext cx="12192000" cy="6858000"/>
+          </a:xfrm>
+          <a:prstGeom prst="rect">
+            <a:avLst/>
+          </a:prstGeom>
+          <a:ln>
+            <a:noFill/>
+          </a:ln>
+        </p:spPr>
+        <p:style>
+          <a:lnRef idx="2">
+            <a:schemeClr val="accent1">
+              <a:shade val="50000"/>
+            </a:schemeClr>
+          </a:lnRef>
+          <a:fillRef idx="1">
+            <a:schemeClr val="accent1"/>
+          </a:fillRef>
+          <a:effectRef idx="0">
+            <a:schemeClr val="accent1"/>
+          </a:effectRef>
+          <a:fontRef idx="minor">
+            <a:schemeClr val="lt1"/>
+          </a:fontRef>
+        </p:style>
+        <p:txBody>
+          <a:bodyPr rtlCol="0" anchor="ctr"/>
+          <a:lstStyle/>
+          <a:p>
+            <a:pPr algn="ctr"/>
+            <a:endParaRPr lang="en-US"/>
+          </a:p>
+        </p:txBody>
+      </p:sp>
+      <p:sp>
+        <p:nvSpPr>
+          <p:cNvPr id="2" name="Título 1">
+            <a:extLst>
+              <a:ext uri="{FF2B5EF4-FFF2-40B4-BE49-F238E27FC236}">
+                <a16:creationId xmlns:a16="http://schemas.microsoft.com/office/drawing/2014/main" id="{92B69FF4-5F8D-4B10-BAEC-4C2B411385B5}"/>
+              </a:ext>
+            </a:extLst>
+          </p:cNvPr>
+          <p:cNvSpPr>
+            <a:spLocks noGrp="1"/>
+          </p:cNvSpPr>
+          <p:nvPr>
+            <p:ph type="ctrTitle"/>
+          </p:nvPr>
+        </p:nvSpPr>
+        <p:spPr>
+          <a:xfrm>
+            <a:off x="1071296" y="4909037"/>
+            <a:ext cx="10668000" cy="1042660"/>
+          </a:xfrm>
+        </p:spPr>
+        <p:txBody>
+          <a:bodyPr vert="horz" lIns="91440" tIns="45720" rIns="91440" bIns="45720" rtlCol="0">
+            <a:normAutofit/>
+          </a:bodyPr>
+          <a:lstStyle/>
+          <a:p>
+            <a:r>
+              <a:rPr lang="en-US" kern="1200" spc="-50" baseline="0" dirty="0">
+                <a:latin typeface="+mj-lt"/>
+                <a:ea typeface="+mj-ea"/>
+                <a:cs typeface="+mj-cs"/>
+              </a:rPr>
+              <a:t>view data using python</a:t>
+            </a:r>
+          </a:p>
+        </p:txBody>
+      </p:sp>
+      <p:pic>
+        <p:nvPicPr>
+          <p:cNvPr id="4" name="Imagen 3">
+            <a:extLst>
+              <a:ext uri="{FF2B5EF4-FFF2-40B4-BE49-F238E27FC236}">
+                <a16:creationId xmlns:a16="http://schemas.microsoft.com/office/drawing/2014/main" id="{A084E6B1-B876-4A12-824C-3BFFC89F103E}"/>
+              </a:ext>
+            </a:extLst>
+          </p:cNvPr>
+          <p:cNvPicPr>
+            <a:picLocks noChangeAspect="1"/>
+          </p:cNvPicPr>
+          <p:nvPr/>
+        </p:nvPicPr>
+        <p:blipFill>
+          <a:blip r:embed="rId2"/>
+          <a:stretch>
+            <a:fillRect/>
+          </a:stretch>
+        </p:blipFill>
+        <p:spPr>
+          <a:xfrm>
+            <a:off x="762000" y="906303"/>
+            <a:ext cx="10977296" cy="3535335"/>
+          </a:xfrm>
+          <a:prstGeom prst="rect">
+            <a:avLst/>
+          </a:prstGeom>
+        </p:spPr>
+      </p:pic>
+    </p:spTree>
+    <p:extLst>
+      <p:ext uri="{BB962C8B-B14F-4D97-AF65-F5344CB8AC3E}">
+        <p14:creationId xmlns:p14="http://schemas.microsoft.com/office/powerpoint/2010/main" val="2456575135"/>
+      </p:ext>
+    </p:extLst>
+  </p:cSld>
+  <p:clrMapOvr>
+    <a:masterClrMapping/>
+  </p:clrMapOvr>
+</p:sld>
+</file>
+
+<file path=ppt/slides/slide8.xml><?xml version="1.0" encoding="utf-8"?>
+<p:sld xmlns:a="http://schemas.openxmlformats.org/drawingml/2006/main" xmlns:r="http://schemas.openxmlformats.org/officeDocument/2006/relationships" xmlns:p="http://schemas.openxmlformats.org/presentationml/2006/main">
+  <p:cSld>
+    <p:bg>
+      <p:bgPr>
+        <a:solidFill>
+          <a:schemeClr val="bg1"/>
+        </a:solidFill>
+        <a:effectLst/>
+      </p:bgPr>
+    </p:bg>
+    <p:spTree>
+      <p:nvGrpSpPr>
+        <p:cNvPr id="1" name=""/>
+        <p:cNvGrpSpPr/>
+        <p:nvPr/>
+      </p:nvGrpSpPr>
+      <p:grpSpPr>
+        <a:xfrm>
+          <a:off x="0" y="0"/>
+          <a:ext cx="0" cy="0"/>
+          <a:chOff x="0" y="0"/>
+          <a:chExt cx="0" cy="0"/>
+        </a:xfrm>
+      </p:grpSpPr>
+      <p:sp useBgFill="1">
+        <p:nvSpPr>
+          <p:cNvPr id="26" name="Rectangle 25">
+            <a:extLst>
+              <a:ext uri="{FF2B5EF4-FFF2-40B4-BE49-F238E27FC236}">
+                <a16:creationId xmlns:a16="http://schemas.microsoft.com/office/drawing/2014/main" id="{220E33D0-A190-4F8A-9DB6-C531C95CA02D}"/>
+              </a:ext>
+              <a:ext uri="{C183D7F6-B498-43B3-948B-1728B52AA6E4}">
+                <adec:decorative xmlns:adec="http://schemas.microsoft.com/office/drawing/2017/decorative" val="1"/>
+              </a:ext>
+            </a:extLst>
+          </p:cNvPr>
+          <p:cNvSpPr>
+            <a:spLocks noGrp="1" noRot="1" noChangeAspect="1" noMove="1" noResize="1" noEditPoints="1" noAdjustHandles="1" noChangeArrowheads="1" noChangeShapeType="1" noTextEdit="1"/>
+          </p:cNvSpPr>
+          <p:nvPr>
+            <p:extLst>
+              <p:ext uri="{386F3935-93C4-4BCD-93E2-E3B085C9AB24}">
+                <p16:designElem xmlns:p16="http://schemas.microsoft.com/office/powerpoint/2015/main" val="1"/>
+              </p:ext>
+            </p:extLst>
+          </p:nvPr>
+        </p:nvSpPr>
+        <p:spPr>
+          <a:xfrm>
+            <a:off x="0" y="0"/>
+            <a:ext cx="12192000" cy="6858000"/>
+          </a:xfrm>
+          <a:prstGeom prst="rect">
+            <a:avLst/>
+          </a:prstGeom>
+          <a:ln>
+            <a:noFill/>
+          </a:ln>
+        </p:spPr>
+        <p:style>
+          <a:lnRef idx="2">
+            <a:schemeClr val="accent1">
+              <a:shade val="50000"/>
+            </a:schemeClr>
+          </a:lnRef>
+          <a:fillRef idx="1">
+            <a:schemeClr val="accent1"/>
+          </a:fillRef>
+          <a:effectRef idx="0">
+            <a:schemeClr val="accent1"/>
+          </a:effectRef>
+          <a:fontRef idx="minor">
+            <a:schemeClr val="lt1"/>
+          </a:fontRef>
+        </p:style>
+        <p:txBody>
+          <a:bodyPr rtlCol="0" anchor="ctr"/>
+          <a:lstStyle/>
+          <a:p>
+            <a:pPr algn="ctr"/>
+            <a:endParaRPr lang="en-US"/>
+          </a:p>
+        </p:txBody>
+      </p:sp>
+      <p:sp>
+        <p:nvSpPr>
+          <p:cNvPr id="2" name="Título 1">
+            <a:extLst>
+              <a:ext uri="{FF2B5EF4-FFF2-40B4-BE49-F238E27FC236}">
+                <a16:creationId xmlns:a16="http://schemas.microsoft.com/office/drawing/2014/main" id="{92B69FF4-5F8D-4B10-BAEC-4C2B411385B5}"/>
+              </a:ext>
+            </a:extLst>
+          </p:cNvPr>
+          <p:cNvSpPr>
+            <a:spLocks noGrp="1"/>
+          </p:cNvSpPr>
+          <p:nvPr>
+            <p:ph type="ctrTitle"/>
+          </p:nvPr>
+        </p:nvSpPr>
+        <p:spPr>
+          <a:xfrm>
+            <a:off x="839047" y="5622853"/>
+            <a:ext cx="10668000" cy="1042660"/>
+          </a:xfrm>
+        </p:spPr>
+        <p:txBody>
+          <a:bodyPr vert="horz" lIns="91440" tIns="45720" rIns="91440" bIns="45720" rtlCol="0">
+            <a:normAutofit/>
+          </a:bodyPr>
+          <a:lstStyle/>
+          <a:p>
+            <a:r>
+              <a:rPr lang="en-US" kern="1200" spc="-50" baseline="0" dirty="0">
+                <a:latin typeface="+mj-lt"/>
+                <a:ea typeface="+mj-ea"/>
+                <a:cs typeface="+mj-cs"/>
+              </a:rPr>
+              <a:t>view data using SQL</a:t>
+            </a:r>
+          </a:p>
+        </p:txBody>
+      </p:sp>
+      <p:pic>
+        <p:nvPicPr>
+          <p:cNvPr id="5" name="Imagen 4">
+            <a:extLst>
+              <a:ext uri="{FF2B5EF4-FFF2-40B4-BE49-F238E27FC236}">
+                <a16:creationId xmlns:a16="http://schemas.microsoft.com/office/drawing/2014/main" id="{ACACBB54-6741-4C7F-BBDC-12731E647445}"/>
+              </a:ext>
+            </a:extLst>
+          </p:cNvPr>
+          <p:cNvPicPr>
+            <a:picLocks noChangeAspect="1"/>
+          </p:cNvPicPr>
+          <p:nvPr/>
+        </p:nvPicPr>
+        <p:blipFill>
+          <a:blip r:embed="rId2"/>
+          <a:stretch>
+            <a:fillRect/>
+          </a:stretch>
+        </p:blipFill>
+        <p:spPr>
+          <a:xfrm>
+            <a:off x="452704" y="388745"/>
+            <a:ext cx="11054343" cy="5041622"/>
+          </a:xfrm>
+          <a:prstGeom prst="rect">
+            <a:avLst/>
+          </a:prstGeom>
+        </p:spPr>
+      </p:pic>
+    </p:spTree>
+    <p:extLst>
+      <p:ext uri="{BB962C8B-B14F-4D97-AF65-F5344CB8AC3E}">
+        <p14:creationId xmlns:p14="http://schemas.microsoft.com/office/powerpoint/2010/main" val="2747392655"/>
+      </p:ext>
+    </p:extLst>
+  </p:cSld>
+  <p:clrMapOvr>
+    <a:masterClrMapping/>
+  </p:clrMapOvr>
+</p:sld>
+</file>
+
+<file path=ppt/slides/slide9.xml><?xml version="1.0" encoding="utf-8"?>
+<p:sld xmlns:a="http://schemas.openxmlformats.org/drawingml/2006/main" xmlns:r="http://schemas.openxmlformats.org/officeDocument/2006/relationships" xmlns:p="http://schemas.openxmlformats.org/presentationml/2006/main">
+  <p:cSld>
+    <p:bg>
+      <p:bgPr>
+        <a:solidFill>
+          <a:schemeClr val="bg1"/>
+        </a:solidFill>
+        <a:effectLst/>
+      </p:bgPr>
+    </p:bg>
+    <p:spTree>
+      <p:nvGrpSpPr>
+        <p:cNvPr id="1" name=""/>
+        <p:cNvGrpSpPr/>
+        <p:nvPr/>
+      </p:nvGrpSpPr>
+      <p:grpSpPr>
+        <a:xfrm>
+          <a:off x="0" y="0"/>
+          <a:ext cx="0" cy="0"/>
+          <a:chOff x="0" y="0"/>
+          <a:chExt cx="0" cy="0"/>
+        </a:xfrm>
+      </p:grpSpPr>
+      <p:sp useBgFill="1">
+        <p:nvSpPr>
+          <p:cNvPr id="26" name="Rectangle 25">
+            <a:extLst>
+              <a:ext uri="{FF2B5EF4-FFF2-40B4-BE49-F238E27FC236}">
+                <a16:creationId xmlns:a16="http://schemas.microsoft.com/office/drawing/2014/main" id="{220E33D0-A190-4F8A-9DB6-C531C95CA02D}"/>
+              </a:ext>
+              <a:ext uri="{C183D7F6-B498-43B3-948B-1728B52AA6E4}">
+                <adec:decorative xmlns:adec="http://schemas.microsoft.com/office/drawing/2017/decorative" val="1"/>
+              </a:ext>
+            </a:extLst>
+          </p:cNvPr>
+          <p:cNvSpPr>
+            <a:spLocks noGrp="1" noRot="1" noChangeAspect="1" noMove="1" noResize="1" noEditPoints="1" noAdjustHandles="1" noChangeArrowheads="1" noChangeShapeType="1" noTextEdit="1"/>
+          </p:cNvSpPr>
+          <p:nvPr>
+            <p:extLst>
+              <p:ext uri="{386F3935-93C4-4BCD-93E2-E3B085C9AB24}">
+                <p16:designElem xmlns:p16="http://schemas.microsoft.com/office/powerpoint/2015/main" val="1"/>
+              </p:ext>
+            </p:extLst>
+          </p:nvPr>
+        </p:nvSpPr>
+        <p:spPr>
+          <a:xfrm>
+            <a:off x="0" y="0"/>
+            <a:ext cx="12192000" cy="6858000"/>
+          </a:xfrm>
+          <a:prstGeom prst="rect">
+            <a:avLst/>
+          </a:prstGeom>
+          <a:ln>
+            <a:noFill/>
+          </a:ln>
+        </p:spPr>
+        <p:style>
+          <a:lnRef idx="2">
+            <a:schemeClr val="accent1">
+              <a:shade val="50000"/>
+            </a:schemeClr>
+          </a:lnRef>
+          <a:fillRef idx="1">
+            <a:schemeClr val="accent1"/>
+          </a:fillRef>
+          <a:effectRef idx="0">
+            <a:schemeClr val="accent1"/>
+          </a:effectRef>
+          <a:fontRef idx="minor">
+            <a:schemeClr val="lt1"/>
+          </a:fontRef>
+        </p:style>
+        <p:txBody>
+          <a:bodyPr rtlCol="0" anchor="ctr"/>
+          <a:lstStyle/>
+          <a:p>
+            <a:pPr algn="ctr"/>
+            <a:endParaRPr lang="en-US"/>
+          </a:p>
+        </p:txBody>
+      </p:sp>
+      <p:sp>
+        <p:nvSpPr>
+          <p:cNvPr id="2" name="Título 1">
+            <a:extLst>
+              <a:ext uri="{FF2B5EF4-FFF2-40B4-BE49-F238E27FC236}">
+                <a16:creationId xmlns:a16="http://schemas.microsoft.com/office/drawing/2014/main" id="{92B69FF4-5F8D-4B10-BAEC-4C2B411385B5}"/>
+              </a:ext>
+            </a:extLst>
+          </p:cNvPr>
+          <p:cNvSpPr>
+            <a:spLocks noGrp="1"/>
+          </p:cNvSpPr>
+          <p:nvPr>
+            <p:ph type="ctrTitle"/>
+          </p:nvPr>
+        </p:nvSpPr>
+        <p:spPr>
+          <a:xfrm>
+            <a:off x="3554112" y="5404502"/>
+            <a:ext cx="3789224" cy="1042660"/>
+          </a:xfrm>
+        </p:spPr>
+        <p:txBody>
+          <a:bodyPr vert="horz" lIns="91440" tIns="45720" rIns="91440" bIns="45720" rtlCol="0">
+            <a:normAutofit/>
+          </a:bodyPr>
+          <a:lstStyle/>
+          <a:p>
+            <a:r>
+              <a:rPr lang="en-US" kern="1200" spc="-50" baseline="0" dirty="0">
+                <a:latin typeface="+mj-lt"/>
+                <a:ea typeface="+mj-ea"/>
+                <a:cs typeface="+mj-cs"/>
+              </a:rPr>
+              <a:t>ERD</a:t>
+            </a:r>
+          </a:p>
+        </p:txBody>
+      </p:sp>
+      <p:pic>
+        <p:nvPicPr>
+          <p:cNvPr id="4" name="Imagen 3" descr="Interfaz de usuario gráfica, Aplicación&#10;&#10;Descripción generada automáticamente">
+            <a:extLst>
+              <a:ext uri="{FF2B5EF4-FFF2-40B4-BE49-F238E27FC236}">
+                <a16:creationId xmlns:a16="http://schemas.microsoft.com/office/drawing/2014/main" id="{6BF912A8-B057-4DC6-9D35-05BE7EDE00D2}"/>
+              </a:ext>
+            </a:extLst>
+          </p:cNvPr>
+          <p:cNvPicPr>
+            <a:picLocks noChangeAspect="1"/>
+          </p:cNvPicPr>
+          <p:nvPr/>
+        </p:nvPicPr>
+        <p:blipFill>
+          <a:blip r:embed="rId2">
+            <a:extLst>
+              <a:ext uri="{28A0092B-C50C-407E-A947-70E740481C1C}">
+                <a14:useLocalDpi xmlns:a14="http://schemas.microsoft.com/office/drawing/2010/main" val="0"/>
+              </a:ext>
+            </a:extLst>
+          </a:blip>
+          <a:stretch>
+            <a:fillRect/>
+          </a:stretch>
+        </p:blipFill>
+        <p:spPr>
+          <a:xfrm>
+            <a:off x="2219838" y="325111"/>
+            <a:ext cx="6966365" cy="6207777"/>
+          </a:xfrm>
+          <a:prstGeom prst="rect">
+            <a:avLst/>
+          </a:prstGeom>
+        </p:spPr>
+      </p:pic>
+    </p:spTree>
+    <p:extLst>
+      <p:ext uri="{BB962C8B-B14F-4D97-AF65-F5344CB8AC3E}">
+        <p14:creationId xmlns:p14="http://schemas.microsoft.com/office/powerpoint/2010/main" val="406522180"/>
+      </p:ext>
+    </p:extLst>
+  </p:cSld>
+  <p:clrMapOvr>
+    <a:masterClrMapping/>
+  </p:clrMapOvr>
 </p:sld>
 </file>
 

</xml_diff>